<commit_message>
alcímek és képek beillesztése
</commit_message>
<xml_diff>
--- a/Monitorok.pptx
+++ b/Monitorok.pptx
@@ -6,12 +6,13 @@
   </p:sldMasterIdLst>
   <p:sldIdLst>
     <p:sldId id="256" r:id="rId2"/>
-    <p:sldId id="257" r:id="rId3"/>
-    <p:sldId id="258" r:id="rId4"/>
-    <p:sldId id="259" r:id="rId5"/>
-    <p:sldId id="260" r:id="rId6"/>
-    <p:sldId id="261" r:id="rId7"/>
-    <p:sldId id="262" r:id="rId8"/>
+    <p:sldId id="258" r:id="rId3"/>
+    <p:sldId id="260" r:id="rId4"/>
+    <p:sldId id="263" r:id="rId5"/>
+    <p:sldId id="261" r:id="rId6"/>
+    <p:sldId id="262" r:id="rId7"/>
+    <p:sldId id="264" r:id="rId8"/>
+    <p:sldId id="265" r:id="rId9"/>
   </p:sldIdLst>
   <p:sldSz cx="12192000" cy="6858000"/>
   <p:notesSz cx="6858000" cy="9144000"/>
@@ -304,7 +305,7 @@
           <a:p>
             <a:fld id="{4AAD347D-5ACD-4C99-B74B-A9C85AD731AF}" type="datetimeFigureOut">
               <a:rPr lang="en-US" dirty="0"/>
-              <a:t>9/12/2022</a:t>
+              <a:t>9/14/2022</a:t>
             </a:fld>
             <a:endParaRPr lang="en-US" dirty="0"/>
           </a:p>
@@ -574,7 +575,7 @@
           <a:p>
             <a:fld id="{4509A250-FF31-4206-8172-F9D3106AACB1}" type="datetimeFigureOut">
               <a:rPr lang="en-US" dirty="0"/>
-              <a:t>9/12/2022</a:t>
+              <a:t>9/14/2022</a:t>
             </a:fld>
             <a:endParaRPr lang="en-US" dirty="0"/>
           </a:p>
@@ -763,7 +764,7 @@
           <a:p>
             <a:fld id="{4509A250-FF31-4206-8172-F9D3106AACB1}" type="datetimeFigureOut">
               <a:rPr lang="en-US" dirty="0"/>
-              <a:t>9/12/2022</a:t>
+              <a:t>9/14/2022</a:t>
             </a:fld>
             <a:endParaRPr lang="en-US" dirty="0"/>
           </a:p>
@@ -1031,7 +1032,7 @@
           <a:p>
             <a:fld id="{4509A250-FF31-4206-8172-F9D3106AACB1}" type="datetimeFigureOut">
               <a:rPr lang="en-US" dirty="0"/>
-              <a:t>9/12/2022</a:t>
+              <a:t>9/14/2022</a:t>
             </a:fld>
             <a:endParaRPr lang="en-US" dirty="0"/>
           </a:p>
@@ -1367,7 +1368,7 @@
           <a:p>
             <a:fld id="{4509A250-FF31-4206-8172-F9D3106AACB1}" type="datetimeFigureOut">
               <a:rPr lang="en-US" dirty="0"/>
-              <a:t>9/12/2022</a:t>
+              <a:t>9/14/2022</a:t>
             </a:fld>
             <a:endParaRPr lang="en-US" dirty="0"/>
           </a:p>
@@ -1985,7 +1986,7 @@
           <a:p>
             <a:fld id="{4509A250-FF31-4206-8172-F9D3106AACB1}" type="datetimeFigureOut">
               <a:rPr lang="en-US" dirty="0"/>
-              <a:t>9/12/2022</a:t>
+              <a:t>9/14/2022</a:t>
             </a:fld>
             <a:endParaRPr lang="en-US" dirty="0"/>
           </a:p>
@@ -2840,7 +2841,7 @@
           <a:p>
             <a:fld id="{4509A250-FF31-4206-8172-F9D3106AACB1}" type="datetimeFigureOut">
               <a:rPr lang="en-US" dirty="0"/>
-              <a:t>9/12/2022</a:t>
+              <a:t>9/14/2022</a:t>
             </a:fld>
             <a:endParaRPr lang="en-US" dirty="0"/>
           </a:p>
@@ -3005,7 +3006,7 @@
           <a:p>
             <a:fld id="{4509A250-FF31-4206-8172-F9D3106AACB1}" type="datetimeFigureOut">
               <a:rPr lang="en-US" dirty="0"/>
-              <a:t>9/12/2022</a:t>
+              <a:t>9/14/2022</a:t>
             </a:fld>
             <a:endParaRPr lang="en-US" dirty="0"/>
           </a:p>
@@ -3180,7 +3181,7 @@
           <a:p>
             <a:fld id="{4509A250-FF31-4206-8172-F9D3106AACB1}" type="datetimeFigureOut">
               <a:rPr lang="en-US" dirty="0"/>
-              <a:t>9/12/2022</a:t>
+              <a:t>9/14/2022</a:t>
             </a:fld>
             <a:endParaRPr lang="en-US" dirty="0"/>
           </a:p>
@@ -3345,7 +3346,7 @@
           <a:p>
             <a:fld id="{4509A250-FF31-4206-8172-F9D3106AACB1}" type="datetimeFigureOut">
               <a:rPr lang="en-US" dirty="0"/>
-              <a:t>9/12/2022</a:t>
+              <a:t>9/14/2022</a:t>
             </a:fld>
             <a:endParaRPr lang="en-US" dirty="0"/>
           </a:p>
@@ -3587,7 +3588,7 @@
           <a:p>
             <a:fld id="{9796027F-7875-4030-9381-8BD8C4F21935}" type="datetimeFigureOut">
               <a:rPr lang="en-US" dirty="0"/>
-              <a:t>9/12/2022</a:t>
+              <a:t>9/14/2022</a:t>
             </a:fld>
             <a:endParaRPr lang="en-US" dirty="0"/>
           </a:p>
@@ -3874,7 +3875,7 @@
           <a:p>
             <a:fld id="{9796027F-7875-4030-9381-8BD8C4F21935}" type="datetimeFigureOut">
               <a:rPr lang="en-US" dirty="0"/>
-              <a:t>9/12/2022</a:t>
+              <a:t>9/14/2022</a:t>
             </a:fld>
             <a:endParaRPr lang="en-US" dirty="0"/>
           </a:p>
@@ -4313,7 +4314,7 @@
           <a:p>
             <a:fld id="{9796027F-7875-4030-9381-8BD8C4F21935}" type="datetimeFigureOut">
               <a:rPr lang="en-US" dirty="0"/>
-              <a:t>9/12/2022</a:t>
+              <a:t>9/14/2022</a:t>
             </a:fld>
             <a:endParaRPr lang="en-US" dirty="0"/>
           </a:p>
@@ -4426,7 +4427,7 @@
           <a:p>
             <a:fld id="{4509A250-FF31-4206-8172-F9D3106AACB1}" type="datetimeFigureOut">
               <a:rPr lang="en-US" dirty="0"/>
-              <a:t>9/12/2022</a:t>
+              <a:t>9/14/2022</a:t>
             </a:fld>
             <a:endParaRPr lang="en-US" dirty="0"/>
           </a:p>
@@ -4516,7 +4517,7 @@
           <a:p>
             <a:fld id="{4509A250-FF31-4206-8172-F9D3106AACB1}" type="datetimeFigureOut">
               <a:rPr lang="en-US" dirty="0"/>
-              <a:t>9/12/2022</a:t>
+              <a:t>9/14/2022</a:t>
             </a:fld>
             <a:endParaRPr lang="en-US" dirty="0"/>
           </a:p>
@@ -4790,7 +4791,7 @@
           <a:p>
             <a:fld id="{4509A250-FF31-4206-8172-F9D3106AACB1}" type="datetimeFigureOut">
               <a:rPr lang="en-US" dirty="0"/>
-              <a:t>9/12/2022</a:t>
+              <a:t>9/14/2022</a:t>
             </a:fld>
             <a:endParaRPr lang="en-US" dirty="0"/>
           </a:p>
@@ -5060,7 +5061,7 @@
           <a:p>
             <a:fld id="{4509A250-FF31-4206-8172-F9D3106AACB1}" type="datetimeFigureOut">
               <a:rPr lang="en-US" dirty="0"/>
-              <a:t>9/12/2022</a:t>
+              <a:t>9/14/2022</a:t>
             </a:fld>
             <a:endParaRPr lang="en-US" dirty="0"/>
           </a:p>
@@ -5484,7 +5485,7 @@
           <a:p>
             <a:fld id="{4AAD347D-5ACD-4C99-B74B-A9C85AD731AF}" type="datetimeFigureOut">
               <a:rPr lang="en-US" dirty="0"/>
-              <a:t>9/12/2022</a:t>
+              <a:t>9/14/2022</a:t>
             </a:fld>
             <a:endParaRPr lang="en-US" dirty="0"/>
           </a:p>
@@ -6020,8 +6021,8 @@
         </p:nvSpPr>
         <p:spPr>
           <a:xfrm>
-            <a:off x="3457888" y="863600"/>
-            <a:ext cx="4619312" cy="1492314"/>
+            <a:off x="2221436" y="1799063"/>
+            <a:ext cx="7406227" cy="842537"/>
           </a:xfrm>
         </p:spPr>
         <p:txBody>
@@ -6029,10 +6030,10 @@
           <a:lstStyle/>
           <a:p>
             <a:r>
-              <a:rPr lang="hu-HU" dirty="0" smtClean="0"/>
-              <a:t>Monitorok</a:t>
-            </a:r>
-            <a:endParaRPr lang="hu-HU" dirty="0"/>
+              <a:rPr lang="hu-HU" sz="6600" dirty="0" smtClean="0"/>
+              <a:t>Gamer Monitorok</a:t>
+            </a:r>
+            <a:endParaRPr lang="hu-HU" sz="6600" dirty="0"/>
           </a:p>
         </p:txBody>
       </p:sp>
@@ -6063,6 +6064,16 @@
           <a:prstGeom prst="rect">
             <a:avLst/>
           </a:prstGeom>
+          <a:ln>
+            <a:noFill/>
+          </a:ln>
+          <a:effectLst>
+            <a:outerShdw blurRad="292100" dist="139700" dir="2700000" algn="tl" rotWithShape="0">
+              <a:srgbClr val="333333">
+                <a:alpha val="65000"/>
+              </a:srgbClr>
+            </a:outerShdw>
+          </a:effectLst>
         </p:spPr>
       </p:pic>
     </p:spTree>
@@ -6075,6 +6086,145 @@
   <p:clrMapOvr>
     <a:masterClrMapping/>
   </p:clrMapOvr>
+  <p:timing>
+    <p:tnLst>
+      <p:par>
+        <p:cTn id="1" dur="indefinite" restart="never" nodeType="tmRoot">
+          <p:childTnLst>
+            <p:seq concurrent="1" nextAc="seek">
+              <p:cTn id="2" dur="indefinite" nodeType="mainSeq">
+                <p:childTnLst>
+                  <p:par>
+                    <p:cTn id="3" fill="hold">
+                      <p:stCondLst>
+                        <p:cond delay="indefinite"/>
+                      </p:stCondLst>
+                      <p:childTnLst>
+                        <p:par>
+                          <p:cTn id="4" fill="hold">
+                            <p:stCondLst>
+                              <p:cond delay="0"/>
+                            </p:stCondLst>
+                            <p:childTnLst>
+                              <p:par>
+                                <p:cTn id="5" presetID="10" presetClass="entr" presetSubtype="0" fill="hold" grpId="0" nodeType="clickEffect">
+                                  <p:stCondLst>
+                                    <p:cond delay="0"/>
+                                  </p:stCondLst>
+                                  <p:childTnLst>
+                                    <p:set>
+                                      <p:cBhvr>
+                                        <p:cTn id="6" dur="1" fill="hold">
+                                          <p:stCondLst>
+                                            <p:cond delay="0"/>
+                                          </p:stCondLst>
+                                        </p:cTn>
+                                        <p:tgtEl>
+                                          <p:spTgt spid="2"/>
+                                        </p:tgtEl>
+                                        <p:attrNameLst>
+                                          <p:attrName>style.visibility</p:attrName>
+                                        </p:attrNameLst>
+                                      </p:cBhvr>
+                                      <p:to>
+                                        <p:strVal val="visible"/>
+                                      </p:to>
+                                    </p:set>
+                                    <p:animEffect transition="in" filter="fade">
+                                      <p:cBhvr>
+                                        <p:cTn id="7" dur="500"/>
+                                        <p:tgtEl>
+                                          <p:spTgt spid="2"/>
+                                        </p:tgtEl>
+                                      </p:cBhvr>
+                                    </p:animEffect>
+                                  </p:childTnLst>
+                                </p:cTn>
+                              </p:par>
+                            </p:childTnLst>
+                          </p:cTn>
+                        </p:par>
+                      </p:childTnLst>
+                    </p:cTn>
+                  </p:par>
+                  <p:par>
+                    <p:cTn id="8" fill="hold">
+                      <p:stCondLst>
+                        <p:cond delay="indefinite"/>
+                      </p:stCondLst>
+                      <p:childTnLst>
+                        <p:par>
+                          <p:cTn id="9" fill="hold">
+                            <p:stCondLst>
+                              <p:cond delay="0"/>
+                            </p:stCondLst>
+                            <p:childTnLst>
+                              <p:par>
+                                <p:cTn id="10" presetID="10" presetClass="entr" presetSubtype="0" fill="hold" nodeType="clickEffect">
+                                  <p:stCondLst>
+                                    <p:cond delay="0"/>
+                                  </p:stCondLst>
+                                  <p:childTnLst>
+                                    <p:set>
+                                      <p:cBhvr>
+                                        <p:cTn id="11" dur="1" fill="hold">
+                                          <p:stCondLst>
+                                            <p:cond delay="0"/>
+                                          </p:stCondLst>
+                                        </p:cTn>
+                                        <p:tgtEl>
+                                          <p:spTgt spid="8"/>
+                                        </p:tgtEl>
+                                        <p:attrNameLst>
+                                          <p:attrName>style.visibility</p:attrName>
+                                        </p:attrNameLst>
+                                      </p:cBhvr>
+                                      <p:to>
+                                        <p:strVal val="visible"/>
+                                      </p:to>
+                                    </p:set>
+                                    <p:animEffect transition="in" filter="fade">
+                                      <p:cBhvr>
+                                        <p:cTn id="12" dur="500"/>
+                                        <p:tgtEl>
+                                          <p:spTgt spid="8"/>
+                                        </p:tgtEl>
+                                      </p:cBhvr>
+                                    </p:animEffect>
+                                  </p:childTnLst>
+                                </p:cTn>
+                              </p:par>
+                            </p:childTnLst>
+                          </p:cTn>
+                        </p:par>
+                      </p:childTnLst>
+                    </p:cTn>
+                  </p:par>
+                </p:childTnLst>
+              </p:cTn>
+              <p:prevCondLst>
+                <p:cond evt="onPrev" delay="0">
+                  <p:tgtEl>
+                    <p:sldTgt/>
+                  </p:tgtEl>
+                </p:cond>
+              </p:prevCondLst>
+              <p:nextCondLst>
+                <p:cond evt="onNext" delay="0">
+                  <p:tgtEl>
+                    <p:sldTgt/>
+                  </p:tgtEl>
+                </p:cond>
+              </p:nextCondLst>
+            </p:seq>
+          </p:childTnLst>
+        </p:cTn>
+      </p:par>
+    </p:tnLst>
+    <p:bldLst>
+      <p:bldP spid="2" grpId="0"/>
+    </p:bldLst>
+  </p:timing>
 </p:sld>
 </file>
 
@@ -6112,7 +6262,7 @@
           <a:p>
             <a:r>
               <a:rPr lang="hu-HU" dirty="0" smtClean="0"/>
-              <a:t>Monitor feladata</a:t>
+              <a:t>Monitor panelfajták</a:t>
             </a:r>
             <a:endParaRPr lang="hu-HU" dirty="0"/>
           </a:p>
@@ -6133,20 +6283,422 @@
           <a:bodyPr/>
           <a:lstStyle/>
           <a:p>
-            <a:endParaRPr lang="hu-HU"/>
-          </a:p>
-        </p:txBody>
-      </p:sp>
+            <a:r>
+              <a:rPr lang="hu-HU" dirty="0" smtClean="0"/>
+              <a:t>IPS</a:t>
+            </a:r>
+          </a:p>
+          <a:p>
+            <a:r>
+              <a:rPr lang="hu-HU" dirty="0" smtClean="0"/>
+              <a:t>VA</a:t>
+            </a:r>
+          </a:p>
+          <a:p>
+            <a:r>
+              <a:rPr lang="hu-HU" dirty="0" smtClean="0"/>
+              <a:t>TN</a:t>
+            </a:r>
+          </a:p>
+          <a:p>
+            <a:r>
+              <a:rPr lang="hu-HU" dirty="0" smtClean="0"/>
+              <a:t>OLED</a:t>
+            </a:r>
+          </a:p>
+          <a:p>
+            <a:endParaRPr lang="hu-HU" dirty="0"/>
+          </a:p>
+        </p:txBody>
+      </p:sp>
+      <p:pic>
+        <p:nvPicPr>
+          <p:cNvPr id="1026" name="Picture 2" descr="IPS, VA vagy TN? - Minden, amit az LCD kijelzőkről tudnod kell"/>
+          <p:cNvPicPr>
+            <a:picLocks noChangeAspect="1" noChangeArrowheads="1"/>
+          </p:cNvPicPr>
+          <p:nvPr/>
+        </p:nvPicPr>
+        <p:blipFill rotWithShape="1">
+          <a:blip r:embed="rId2">
+            <a:extLst>
+              <a:ext uri="{28A0092B-C50C-407E-A947-70E740481C1C}">
+                <a14:useLocalDpi xmlns:a14="http://schemas.microsoft.com/office/drawing/2010/main" val="0"/>
+              </a:ext>
+            </a:extLst>
+          </a:blip>
+          <a:srcRect l="7361" t="212" r="7741" b="3907"/>
+          <a:stretch/>
+        </p:blipFill>
+        <p:spPr bwMode="auto">
+          <a:xfrm>
+            <a:off x="6093055" y="1655912"/>
+            <a:ext cx="5687121" cy="3912777"/>
+          </a:xfrm>
+          <a:prstGeom prst="rect">
+            <a:avLst/>
+          </a:prstGeom>
+          <a:ln>
+            <a:noFill/>
+          </a:ln>
+          <a:effectLst>
+            <a:outerShdw blurRad="292100" dist="139700" dir="2700000" algn="tl" rotWithShape="0">
+              <a:srgbClr val="333333">
+                <a:alpha val="65000"/>
+              </a:srgbClr>
+            </a:outerShdw>
+          </a:effectLst>
+          <a:extLst>
+            <a:ext uri="{909E8E84-426E-40DD-AFC4-6F175D3DCCD1}">
+              <a14:hiddenFill xmlns:a14="http://schemas.microsoft.com/office/drawing/2010/main">
+                <a:solidFill>
+                  <a:srgbClr val="FFFFFF"/>
+                </a:solidFill>
+              </a14:hiddenFill>
+            </a:ext>
+          </a:extLst>
+        </p:spPr>
+      </p:pic>
     </p:spTree>
     <p:extLst>
       <p:ext uri="{BB962C8B-B14F-4D97-AF65-F5344CB8AC3E}">
-        <p14:creationId xmlns:p14="http://schemas.microsoft.com/office/powerpoint/2010/main" val="1818004075"/>
+        <p14:creationId xmlns:p14="http://schemas.microsoft.com/office/powerpoint/2010/main" val="2659064262"/>
       </p:ext>
     </p:extLst>
   </p:cSld>
   <p:clrMapOvr>
     <a:masterClrMapping/>
   </p:clrMapOvr>
+  <p:timing>
+    <p:tnLst>
+      <p:par>
+        <p:cTn id="1" dur="indefinite" restart="never" nodeType="tmRoot">
+          <p:childTnLst>
+            <p:seq concurrent="1" nextAc="seek">
+              <p:cTn id="2" dur="indefinite" nodeType="mainSeq">
+                <p:childTnLst>
+                  <p:par>
+                    <p:cTn id="3" fill="hold">
+                      <p:stCondLst>
+                        <p:cond delay="indefinite"/>
+                      </p:stCondLst>
+                      <p:childTnLst>
+                        <p:par>
+                          <p:cTn id="4" fill="hold">
+                            <p:stCondLst>
+                              <p:cond delay="0"/>
+                            </p:stCondLst>
+                            <p:childTnLst>
+                              <p:par>
+                                <p:cTn id="5" presetID="10" presetClass="entr" presetSubtype="0" fill="hold" grpId="0" nodeType="clickEffect">
+                                  <p:stCondLst>
+                                    <p:cond delay="0"/>
+                                  </p:stCondLst>
+                                  <p:childTnLst>
+                                    <p:set>
+                                      <p:cBhvr>
+                                        <p:cTn id="6" dur="1" fill="hold">
+                                          <p:stCondLst>
+                                            <p:cond delay="0"/>
+                                          </p:stCondLst>
+                                        </p:cTn>
+                                        <p:tgtEl>
+                                          <p:spTgt spid="3">
+                                            <p:txEl>
+                                              <p:pRg st="0" end="0"/>
+                                            </p:txEl>
+                                          </p:spTgt>
+                                        </p:tgtEl>
+                                        <p:attrNameLst>
+                                          <p:attrName>style.visibility</p:attrName>
+                                        </p:attrNameLst>
+                                      </p:cBhvr>
+                                      <p:to>
+                                        <p:strVal val="visible"/>
+                                      </p:to>
+                                    </p:set>
+                                    <p:animEffect transition="in" filter="fade">
+                                      <p:cBhvr>
+                                        <p:cTn id="7" dur="500"/>
+                                        <p:tgtEl>
+                                          <p:spTgt spid="3">
+                                            <p:txEl>
+                                              <p:pRg st="0" end="0"/>
+                                            </p:txEl>
+                                          </p:spTgt>
+                                        </p:tgtEl>
+                                      </p:cBhvr>
+                                    </p:animEffect>
+                                  </p:childTnLst>
+                                </p:cTn>
+                              </p:par>
+                            </p:childTnLst>
+                          </p:cTn>
+                        </p:par>
+                      </p:childTnLst>
+                    </p:cTn>
+                  </p:par>
+                  <p:par>
+                    <p:cTn id="8" fill="hold">
+                      <p:stCondLst>
+                        <p:cond delay="indefinite"/>
+                      </p:stCondLst>
+                      <p:childTnLst>
+                        <p:par>
+                          <p:cTn id="9" fill="hold">
+                            <p:stCondLst>
+                              <p:cond delay="0"/>
+                            </p:stCondLst>
+                            <p:childTnLst>
+                              <p:par>
+                                <p:cTn id="10" presetID="10" presetClass="entr" presetSubtype="0" fill="hold" grpId="0" nodeType="clickEffect">
+                                  <p:stCondLst>
+                                    <p:cond delay="0"/>
+                                  </p:stCondLst>
+                                  <p:childTnLst>
+                                    <p:set>
+                                      <p:cBhvr>
+                                        <p:cTn id="11" dur="1" fill="hold">
+                                          <p:stCondLst>
+                                            <p:cond delay="0"/>
+                                          </p:stCondLst>
+                                        </p:cTn>
+                                        <p:tgtEl>
+                                          <p:spTgt spid="3">
+                                            <p:txEl>
+                                              <p:pRg st="1" end="1"/>
+                                            </p:txEl>
+                                          </p:spTgt>
+                                        </p:tgtEl>
+                                        <p:attrNameLst>
+                                          <p:attrName>style.visibility</p:attrName>
+                                        </p:attrNameLst>
+                                      </p:cBhvr>
+                                      <p:to>
+                                        <p:strVal val="visible"/>
+                                      </p:to>
+                                    </p:set>
+                                    <p:animEffect transition="in" filter="fade">
+                                      <p:cBhvr>
+                                        <p:cTn id="12" dur="500"/>
+                                        <p:tgtEl>
+                                          <p:spTgt spid="3">
+                                            <p:txEl>
+                                              <p:pRg st="1" end="1"/>
+                                            </p:txEl>
+                                          </p:spTgt>
+                                        </p:tgtEl>
+                                      </p:cBhvr>
+                                    </p:animEffect>
+                                  </p:childTnLst>
+                                </p:cTn>
+                              </p:par>
+                            </p:childTnLst>
+                          </p:cTn>
+                        </p:par>
+                      </p:childTnLst>
+                    </p:cTn>
+                  </p:par>
+                  <p:par>
+                    <p:cTn id="13" fill="hold">
+                      <p:stCondLst>
+                        <p:cond delay="indefinite"/>
+                      </p:stCondLst>
+                      <p:childTnLst>
+                        <p:par>
+                          <p:cTn id="14" fill="hold">
+                            <p:stCondLst>
+                              <p:cond delay="0"/>
+                            </p:stCondLst>
+                            <p:childTnLst>
+                              <p:par>
+                                <p:cTn id="15" presetID="10" presetClass="entr" presetSubtype="0" fill="hold" grpId="0" nodeType="clickEffect">
+                                  <p:stCondLst>
+                                    <p:cond delay="0"/>
+                                  </p:stCondLst>
+                                  <p:childTnLst>
+                                    <p:set>
+                                      <p:cBhvr>
+                                        <p:cTn id="16" dur="1" fill="hold">
+                                          <p:stCondLst>
+                                            <p:cond delay="0"/>
+                                          </p:stCondLst>
+                                        </p:cTn>
+                                        <p:tgtEl>
+                                          <p:spTgt spid="3">
+                                            <p:txEl>
+                                              <p:pRg st="2" end="2"/>
+                                            </p:txEl>
+                                          </p:spTgt>
+                                        </p:tgtEl>
+                                        <p:attrNameLst>
+                                          <p:attrName>style.visibility</p:attrName>
+                                        </p:attrNameLst>
+                                      </p:cBhvr>
+                                      <p:to>
+                                        <p:strVal val="visible"/>
+                                      </p:to>
+                                    </p:set>
+                                    <p:animEffect transition="in" filter="fade">
+                                      <p:cBhvr>
+                                        <p:cTn id="17" dur="500"/>
+                                        <p:tgtEl>
+                                          <p:spTgt spid="3">
+                                            <p:txEl>
+                                              <p:pRg st="2" end="2"/>
+                                            </p:txEl>
+                                          </p:spTgt>
+                                        </p:tgtEl>
+                                      </p:cBhvr>
+                                    </p:animEffect>
+                                  </p:childTnLst>
+                                </p:cTn>
+                              </p:par>
+                            </p:childTnLst>
+                          </p:cTn>
+                        </p:par>
+                      </p:childTnLst>
+                    </p:cTn>
+                  </p:par>
+                  <p:par>
+                    <p:cTn id="18" fill="hold">
+                      <p:stCondLst>
+                        <p:cond delay="indefinite"/>
+                      </p:stCondLst>
+                      <p:childTnLst>
+                        <p:par>
+                          <p:cTn id="19" fill="hold">
+                            <p:stCondLst>
+                              <p:cond delay="0"/>
+                            </p:stCondLst>
+                            <p:childTnLst>
+                              <p:par>
+                                <p:cTn id="20" presetID="10" presetClass="entr" presetSubtype="0" fill="hold" grpId="0" nodeType="clickEffect">
+                                  <p:stCondLst>
+                                    <p:cond delay="0"/>
+                                  </p:stCondLst>
+                                  <p:childTnLst>
+                                    <p:set>
+                                      <p:cBhvr>
+                                        <p:cTn id="21" dur="1" fill="hold">
+                                          <p:stCondLst>
+                                            <p:cond delay="0"/>
+                                          </p:stCondLst>
+                                        </p:cTn>
+                                        <p:tgtEl>
+                                          <p:spTgt spid="3">
+                                            <p:txEl>
+                                              <p:pRg st="3" end="3"/>
+                                            </p:txEl>
+                                          </p:spTgt>
+                                        </p:tgtEl>
+                                        <p:attrNameLst>
+                                          <p:attrName>style.visibility</p:attrName>
+                                        </p:attrNameLst>
+                                      </p:cBhvr>
+                                      <p:to>
+                                        <p:strVal val="visible"/>
+                                      </p:to>
+                                    </p:set>
+                                    <p:animEffect transition="in" filter="fade">
+                                      <p:cBhvr>
+                                        <p:cTn id="22" dur="500"/>
+                                        <p:tgtEl>
+                                          <p:spTgt spid="3">
+                                            <p:txEl>
+                                              <p:pRg st="3" end="3"/>
+                                            </p:txEl>
+                                          </p:spTgt>
+                                        </p:tgtEl>
+                                      </p:cBhvr>
+                                    </p:animEffect>
+                                  </p:childTnLst>
+                                </p:cTn>
+                              </p:par>
+                            </p:childTnLst>
+                          </p:cTn>
+                        </p:par>
+                      </p:childTnLst>
+                    </p:cTn>
+                  </p:par>
+                  <p:par>
+                    <p:cTn id="23" fill="hold">
+                      <p:stCondLst>
+                        <p:cond delay="indefinite"/>
+                      </p:stCondLst>
+                      <p:childTnLst>
+                        <p:par>
+                          <p:cTn id="24" fill="hold">
+                            <p:stCondLst>
+                              <p:cond delay="0"/>
+                            </p:stCondLst>
+                            <p:childTnLst>
+                              <p:par>
+                                <p:cTn id="25" presetID="10" presetClass="entr" presetSubtype="0" fill="hold" nodeType="clickEffect">
+                                  <p:stCondLst>
+                                    <p:cond delay="0"/>
+                                  </p:stCondLst>
+                                  <p:childTnLst>
+                                    <p:set>
+                                      <p:cBhvr>
+                                        <p:cTn id="26" dur="1" fill="hold">
+                                          <p:stCondLst>
+                                            <p:cond delay="0"/>
+                                          </p:stCondLst>
+                                        </p:cTn>
+                                        <p:tgtEl>
+                                          <p:spTgt spid="1026"/>
+                                        </p:tgtEl>
+                                        <p:attrNameLst>
+                                          <p:attrName>style.visibility</p:attrName>
+                                        </p:attrNameLst>
+                                      </p:cBhvr>
+                                      <p:to>
+                                        <p:strVal val="visible"/>
+                                      </p:to>
+                                    </p:set>
+                                    <p:animEffect transition="in" filter="fade">
+                                      <p:cBhvr>
+                                        <p:cTn id="27" dur="500"/>
+                                        <p:tgtEl>
+                                          <p:spTgt spid="1026"/>
+                                        </p:tgtEl>
+                                      </p:cBhvr>
+                                    </p:animEffect>
+                                  </p:childTnLst>
+                                </p:cTn>
+                              </p:par>
+                            </p:childTnLst>
+                          </p:cTn>
+                        </p:par>
+                      </p:childTnLst>
+                    </p:cTn>
+                  </p:par>
+                </p:childTnLst>
+              </p:cTn>
+              <p:prevCondLst>
+                <p:cond evt="onPrev" delay="0">
+                  <p:tgtEl>
+                    <p:sldTgt/>
+                  </p:tgtEl>
+                </p:cond>
+              </p:prevCondLst>
+              <p:nextCondLst>
+                <p:cond evt="onNext" delay="0">
+                  <p:tgtEl>
+                    <p:sldTgt/>
+                  </p:tgtEl>
+                </p:cond>
+              </p:nextCondLst>
+            </p:seq>
+          </p:childTnLst>
+        </p:cTn>
+      </p:par>
+    </p:tnLst>
+    <p:bldLst>
+      <p:bldP spid="3" grpId="0" build="p"/>
+    </p:bldLst>
+  </p:timing>
 </p:sld>
 </file>
 
@@ -6183,8 +6735,12 @@
           <a:lstStyle/>
           <a:p>
             <a:r>
+              <a:rPr lang="hu-HU" dirty="0"/>
+              <a:t>F</a:t>
+            </a:r>
+            <a:r>
               <a:rPr lang="hu-HU" dirty="0" smtClean="0"/>
-              <a:t>Monitor panelfajták</a:t>
+              <a:t>rissítési gyakorisága </a:t>
             </a:r>
             <a:endParaRPr lang="hu-HU" dirty="0"/>
           </a:p>
@@ -6205,20 +6761,537 @@
           <a:bodyPr/>
           <a:lstStyle/>
           <a:p>
-            <a:endParaRPr lang="hu-HU"/>
-          </a:p>
-        </p:txBody>
-      </p:sp>
+            <a:r>
+              <a:rPr lang="hu-HU" dirty="0" smtClean="0"/>
+              <a:t>60hz-max 60fps</a:t>
+            </a:r>
+          </a:p>
+          <a:p>
+            <a:r>
+              <a:rPr lang="hu-HU" dirty="0" smtClean="0"/>
+              <a:t>144hz</a:t>
+            </a:r>
+          </a:p>
+          <a:p>
+            <a:r>
+              <a:rPr lang="hu-HU" dirty="0" smtClean="0"/>
+              <a:t>165hz</a:t>
+            </a:r>
+          </a:p>
+          <a:p>
+            <a:r>
+              <a:rPr lang="hu-HU" dirty="0" smtClean="0"/>
+              <a:t>240hz</a:t>
+            </a:r>
+          </a:p>
+          <a:p>
+            <a:r>
+              <a:rPr lang="hu-HU" dirty="0" smtClean="0"/>
+              <a:t>360hz</a:t>
+            </a:r>
+            <a:endParaRPr lang="hu-HU" dirty="0"/>
+          </a:p>
+          <a:p>
+            <a:r>
+              <a:rPr lang="hu-HU" dirty="0" smtClean="0"/>
+              <a:t>500hz</a:t>
+            </a:r>
+            <a:endParaRPr lang="hu-HU" dirty="0"/>
+          </a:p>
+        </p:txBody>
+      </p:sp>
+      <p:pic>
+        <p:nvPicPr>
+          <p:cNvPr id="4" name="Kép 3"/>
+          <p:cNvPicPr>
+            <a:picLocks noChangeAspect="1"/>
+          </p:cNvPicPr>
+          <p:nvPr/>
+        </p:nvPicPr>
+        <p:blipFill>
+          <a:blip r:embed="rId2">
+            <a:extLst>
+              <a:ext uri="{28A0092B-C50C-407E-A947-70E740481C1C}">
+                <a14:useLocalDpi xmlns:a14="http://schemas.microsoft.com/office/drawing/2010/main" val="0"/>
+              </a:ext>
+            </a:extLst>
+          </a:blip>
+          <a:stretch>
+            <a:fillRect/>
+          </a:stretch>
+        </p:blipFill>
+        <p:spPr>
+          <a:xfrm>
+            <a:off x="6954644" y="1524930"/>
+            <a:ext cx="4572000" cy="2514600"/>
+          </a:xfrm>
+          <a:prstGeom prst="rect">
+            <a:avLst/>
+          </a:prstGeom>
+        </p:spPr>
+      </p:pic>
     </p:spTree>
     <p:extLst>
       <p:ext uri="{BB962C8B-B14F-4D97-AF65-F5344CB8AC3E}">
-        <p14:creationId xmlns:p14="http://schemas.microsoft.com/office/powerpoint/2010/main" val="2659064262"/>
+        <p14:creationId xmlns:p14="http://schemas.microsoft.com/office/powerpoint/2010/main" val="759364794"/>
       </p:ext>
     </p:extLst>
   </p:cSld>
   <p:clrMapOvr>
     <a:masterClrMapping/>
   </p:clrMapOvr>
+  <p:timing>
+    <p:tnLst>
+      <p:par>
+        <p:cTn id="1" dur="indefinite" restart="never" nodeType="tmRoot">
+          <p:childTnLst>
+            <p:seq concurrent="1" nextAc="seek">
+              <p:cTn id="2" dur="indefinite" nodeType="mainSeq">
+                <p:childTnLst>
+                  <p:par>
+                    <p:cTn id="3" fill="hold">
+                      <p:stCondLst>
+                        <p:cond delay="indefinite"/>
+                      </p:stCondLst>
+                      <p:childTnLst>
+                        <p:par>
+                          <p:cTn id="4" fill="hold">
+                            <p:stCondLst>
+                              <p:cond delay="0"/>
+                            </p:stCondLst>
+                            <p:childTnLst>
+                              <p:par>
+                                <p:cTn id="5" presetID="10" presetClass="entr" presetSubtype="0" fill="hold" grpId="0" nodeType="clickEffect">
+                                  <p:stCondLst>
+                                    <p:cond delay="0"/>
+                                  </p:stCondLst>
+                                  <p:childTnLst>
+                                    <p:set>
+                                      <p:cBhvr>
+                                        <p:cTn id="6" dur="1" fill="hold">
+                                          <p:stCondLst>
+                                            <p:cond delay="0"/>
+                                          </p:stCondLst>
+                                        </p:cTn>
+                                        <p:tgtEl>
+                                          <p:spTgt spid="3">
+                                            <p:txEl>
+                                              <p:pRg st="0" end="0"/>
+                                            </p:txEl>
+                                          </p:spTgt>
+                                        </p:tgtEl>
+                                        <p:attrNameLst>
+                                          <p:attrName>style.visibility</p:attrName>
+                                        </p:attrNameLst>
+                                      </p:cBhvr>
+                                      <p:to>
+                                        <p:strVal val="visible"/>
+                                      </p:to>
+                                    </p:set>
+                                    <p:animEffect transition="in" filter="fade">
+                                      <p:cBhvr>
+                                        <p:cTn id="7" dur="500"/>
+                                        <p:tgtEl>
+                                          <p:spTgt spid="3">
+                                            <p:txEl>
+                                              <p:pRg st="0" end="0"/>
+                                            </p:txEl>
+                                          </p:spTgt>
+                                        </p:tgtEl>
+                                      </p:cBhvr>
+                                    </p:animEffect>
+                                  </p:childTnLst>
+                                </p:cTn>
+                              </p:par>
+                            </p:childTnLst>
+                          </p:cTn>
+                        </p:par>
+                      </p:childTnLst>
+                    </p:cTn>
+                  </p:par>
+                  <p:par>
+                    <p:cTn id="8" fill="hold">
+                      <p:stCondLst>
+                        <p:cond delay="indefinite"/>
+                      </p:stCondLst>
+                      <p:childTnLst>
+                        <p:par>
+                          <p:cTn id="9" fill="hold">
+                            <p:stCondLst>
+                              <p:cond delay="0"/>
+                            </p:stCondLst>
+                            <p:childTnLst>
+                              <p:par>
+                                <p:cTn id="10" presetID="10" presetClass="entr" presetSubtype="0" fill="hold" grpId="0" nodeType="clickEffect">
+                                  <p:stCondLst>
+                                    <p:cond delay="0"/>
+                                  </p:stCondLst>
+                                  <p:childTnLst>
+                                    <p:set>
+                                      <p:cBhvr>
+                                        <p:cTn id="11" dur="1" fill="hold">
+                                          <p:stCondLst>
+                                            <p:cond delay="0"/>
+                                          </p:stCondLst>
+                                        </p:cTn>
+                                        <p:tgtEl>
+                                          <p:spTgt spid="3">
+                                            <p:txEl>
+                                              <p:pRg st="1" end="1"/>
+                                            </p:txEl>
+                                          </p:spTgt>
+                                        </p:tgtEl>
+                                        <p:attrNameLst>
+                                          <p:attrName>style.visibility</p:attrName>
+                                        </p:attrNameLst>
+                                      </p:cBhvr>
+                                      <p:to>
+                                        <p:strVal val="visible"/>
+                                      </p:to>
+                                    </p:set>
+                                    <p:animEffect transition="in" filter="fade">
+                                      <p:cBhvr>
+                                        <p:cTn id="12" dur="500"/>
+                                        <p:tgtEl>
+                                          <p:spTgt spid="3">
+                                            <p:txEl>
+                                              <p:pRg st="1" end="1"/>
+                                            </p:txEl>
+                                          </p:spTgt>
+                                        </p:tgtEl>
+                                      </p:cBhvr>
+                                    </p:animEffect>
+                                  </p:childTnLst>
+                                </p:cTn>
+                              </p:par>
+                            </p:childTnLst>
+                          </p:cTn>
+                        </p:par>
+                      </p:childTnLst>
+                    </p:cTn>
+                  </p:par>
+                  <p:par>
+                    <p:cTn id="13" fill="hold">
+                      <p:stCondLst>
+                        <p:cond delay="indefinite"/>
+                      </p:stCondLst>
+                      <p:childTnLst>
+                        <p:par>
+                          <p:cTn id="14" fill="hold">
+                            <p:stCondLst>
+                              <p:cond delay="0"/>
+                            </p:stCondLst>
+                            <p:childTnLst>
+                              <p:par>
+                                <p:cTn id="15" presetID="10" presetClass="entr" presetSubtype="0" fill="hold" grpId="0" nodeType="clickEffect">
+                                  <p:stCondLst>
+                                    <p:cond delay="0"/>
+                                  </p:stCondLst>
+                                  <p:childTnLst>
+                                    <p:set>
+                                      <p:cBhvr>
+                                        <p:cTn id="16" dur="1" fill="hold">
+                                          <p:stCondLst>
+                                            <p:cond delay="0"/>
+                                          </p:stCondLst>
+                                        </p:cTn>
+                                        <p:tgtEl>
+                                          <p:spTgt spid="3">
+                                            <p:txEl>
+                                              <p:pRg st="2" end="2"/>
+                                            </p:txEl>
+                                          </p:spTgt>
+                                        </p:tgtEl>
+                                        <p:attrNameLst>
+                                          <p:attrName>style.visibility</p:attrName>
+                                        </p:attrNameLst>
+                                      </p:cBhvr>
+                                      <p:to>
+                                        <p:strVal val="visible"/>
+                                      </p:to>
+                                    </p:set>
+                                    <p:animEffect transition="in" filter="fade">
+                                      <p:cBhvr>
+                                        <p:cTn id="17" dur="500"/>
+                                        <p:tgtEl>
+                                          <p:spTgt spid="3">
+                                            <p:txEl>
+                                              <p:pRg st="2" end="2"/>
+                                            </p:txEl>
+                                          </p:spTgt>
+                                        </p:tgtEl>
+                                      </p:cBhvr>
+                                    </p:animEffect>
+                                  </p:childTnLst>
+                                </p:cTn>
+                              </p:par>
+                            </p:childTnLst>
+                          </p:cTn>
+                        </p:par>
+                      </p:childTnLst>
+                    </p:cTn>
+                  </p:par>
+                  <p:par>
+                    <p:cTn id="18" fill="hold">
+                      <p:stCondLst>
+                        <p:cond delay="indefinite"/>
+                      </p:stCondLst>
+                      <p:childTnLst>
+                        <p:par>
+                          <p:cTn id="19" fill="hold">
+                            <p:stCondLst>
+                              <p:cond delay="0"/>
+                            </p:stCondLst>
+                            <p:childTnLst>
+                              <p:par>
+                                <p:cTn id="20" presetID="10" presetClass="entr" presetSubtype="0" fill="hold" grpId="0" nodeType="clickEffect">
+                                  <p:stCondLst>
+                                    <p:cond delay="0"/>
+                                  </p:stCondLst>
+                                  <p:childTnLst>
+                                    <p:set>
+                                      <p:cBhvr>
+                                        <p:cTn id="21" dur="1" fill="hold">
+                                          <p:stCondLst>
+                                            <p:cond delay="0"/>
+                                          </p:stCondLst>
+                                        </p:cTn>
+                                        <p:tgtEl>
+                                          <p:spTgt spid="3">
+                                            <p:txEl>
+                                              <p:pRg st="3" end="3"/>
+                                            </p:txEl>
+                                          </p:spTgt>
+                                        </p:tgtEl>
+                                        <p:attrNameLst>
+                                          <p:attrName>style.visibility</p:attrName>
+                                        </p:attrNameLst>
+                                      </p:cBhvr>
+                                      <p:to>
+                                        <p:strVal val="visible"/>
+                                      </p:to>
+                                    </p:set>
+                                    <p:animEffect transition="in" filter="fade">
+                                      <p:cBhvr>
+                                        <p:cTn id="22" dur="500"/>
+                                        <p:tgtEl>
+                                          <p:spTgt spid="3">
+                                            <p:txEl>
+                                              <p:pRg st="3" end="3"/>
+                                            </p:txEl>
+                                          </p:spTgt>
+                                        </p:tgtEl>
+                                      </p:cBhvr>
+                                    </p:animEffect>
+                                  </p:childTnLst>
+                                </p:cTn>
+                              </p:par>
+                            </p:childTnLst>
+                          </p:cTn>
+                        </p:par>
+                      </p:childTnLst>
+                    </p:cTn>
+                  </p:par>
+                  <p:par>
+                    <p:cTn id="23" fill="hold">
+                      <p:stCondLst>
+                        <p:cond delay="indefinite"/>
+                      </p:stCondLst>
+                      <p:childTnLst>
+                        <p:par>
+                          <p:cTn id="24" fill="hold">
+                            <p:stCondLst>
+                              <p:cond delay="0"/>
+                            </p:stCondLst>
+                            <p:childTnLst>
+                              <p:par>
+                                <p:cTn id="25" presetID="10" presetClass="entr" presetSubtype="0" fill="hold" grpId="0" nodeType="clickEffect">
+                                  <p:stCondLst>
+                                    <p:cond delay="0"/>
+                                  </p:stCondLst>
+                                  <p:childTnLst>
+                                    <p:set>
+                                      <p:cBhvr>
+                                        <p:cTn id="26" dur="1" fill="hold">
+                                          <p:stCondLst>
+                                            <p:cond delay="0"/>
+                                          </p:stCondLst>
+                                        </p:cTn>
+                                        <p:tgtEl>
+                                          <p:spTgt spid="3">
+                                            <p:txEl>
+                                              <p:pRg st="4" end="4"/>
+                                            </p:txEl>
+                                          </p:spTgt>
+                                        </p:tgtEl>
+                                        <p:attrNameLst>
+                                          <p:attrName>style.visibility</p:attrName>
+                                        </p:attrNameLst>
+                                      </p:cBhvr>
+                                      <p:to>
+                                        <p:strVal val="visible"/>
+                                      </p:to>
+                                    </p:set>
+                                    <p:animEffect transition="in" filter="fade">
+                                      <p:cBhvr>
+                                        <p:cTn id="27" dur="500"/>
+                                        <p:tgtEl>
+                                          <p:spTgt spid="3">
+                                            <p:txEl>
+                                              <p:pRg st="4" end="4"/>
+                                            </p:txEl>
+                                          </p:spTgt>
+                                        </p:tgtEl>
+                                      </p:cBhvr>
+                                    </p:animEffect>
+                                  </p:childTnLst>
+                                </p:cTn>
+                              </p:par>
+                            </p:childTnLst>
+                          </p:cTn>
+                        </p:par>
+                      </p:childTnLst>
+                    </p:cTn>
+                  </p:par>
+                  <p:par>
+                    <p:cTn id="28" fill="hold">
+                      <p:stCondLst>
+                        <p:cond delay="indefinite"/>
+                      </p:stCondLst>
+                      <p:childTnLst>
+                        <p:par>
+                          <p:cTn id="29" fill="hold">
+                            <p:stCondLst>
+                              <p:cond delay="0"/>
+                            </p:stCondLst>
+                            <p:childTnLst>
+                              <p:par>
+                                <p:cTn id="30" presetID="10" presetClass="entr" presetSubtype="0" fill="hold" grpId="0" nodeType="clickEffect">
+                                  <p:stCondLst>
+                                    <p:cond delay="0"/>
+                                  </p:stCondLst>
+                                  <p:childTnLst>
+                                    <p:set>
+                                      <p:cBhvr>
+                                        <p:cTn id="31" dur="1" fill="hold">
+                                          <p:stCondLst>
+                                            <p:cond delay="0"/>
+                                          </p:stCondLst>
+                                        </p:cTn>
+                                        <p:tgtEl>
+                                          <p:spTgt spid="3">
+                                            <p:txEl>
+                                              <p:pRg st="5" end="5"/>
+                                            </p:txEl>
+                                          </p:spTgt>
+                                        </p:tgtEl>
+                                        <p:attrNameLst>
+                                          <p:attrName>style.visibility</p:attrName>
+                                        </p:attrNameLst>
+                                      </p:cBhvr>
+                                      <p:to>
+                                        <p:strVal val="visible"/>
+                                      </p:to>
+                                    </p:set>
+                                    <p:animEffect transition="in" filter="fade">
+                                      <p:cBhvr>
+                                        <p:cTn id="32" dur="500"/>
+                                        <p:tgtEl>
+                                          <p:spTgt spid="3">
+                                            <p:txEl>
+                                              <p:pRg st="5" end="5"/>
+                                            </p:txEl>
+                                          </p:spTgt>
+                                        </p:tgtEl>
+                                      </p:cBhvr>
+                                    </p:animEffect>
+                                  </p:childTnLst>
+                                </p:cTn>
+                              </p:par>
+                            </p:childTnLst>
+                          </p:cTn>
+                        </p:par>
+                      </p:childTnLst>
+                    </p:cTn>
+                  </p:par>
+                  <p:par>
+                    <p:cTn id="33" fill="hold">
+                      <p:stCondLst>
+                        <p:cond delay="indefinite"/>
+                      </p:stCondLst>
+                      <p:childTnLst>
+                        <p:par>
+                          <p:cTn id="34" fill="hold">
+                            <p:stCondLst>
+                              <p:cond delay="0"/>
+                            </p:stCondLst>
+                            <p:childTnLst>
+                              <p:par>
+                                <p:cTn id="35" presetID="10" presetClass="entr" presetSubtype="0" fill="hold" nodeType="clickEffect">
+                                  <p:stCondLst>
+                                    <p:cond delay="0"/>
+                                  </p:stCondLst>
+                                  <p:childTnLst>
+                                    <p:set>
+                                      <p:cBhvr>
+                                        <p:cTn id="36" dur="1" fill="hold">
+                                          <p:stCondLst>
+                                            <p:cond delay="0"/>
+                                          </p:stCondLst>
+                                        </p:cTn>
+                                        <p:tgtEl>
+                                          <p:spTgt spid="4"/>
+                                        </p:tgtEl>
+                                        <p:attrNameLst>
+                                          <p:attrName>style.visibility</p:attrName>
+                                        </p:attrNameLst>
+                                      </p:cBhvr>
+                                      <p:to>
+                                        <p:strVal val="visible"/>
+                                      </p:to>
+                                    </p:set>
+                                    <p:animEffect transition="in" filter="fade">
+                                      <p:cBhvr>
+                                        <p:cTn id="37" dur="500"/>
+                                        <p:tgtEl>
+                                          <p:spTgt spid="4"/>
+                                        </p:tgtEl>
+                                      </p:cBhvr>
+                                    </p:animEffect>
+                                  </p:childTnLst>
+                                </p:cTn>
+                              </p:par>
+                            </p:childTnLst>
+                          </p:cTn>
+                        </p:par>
+                      </p:childTnLst>
+                    </p:cTn>
+                  </p:par>
+                </p:childTnLst>
+              </p:cTn>
+              <p:prevCondLst>
+                <p:cond evt="onPrev" delay="0">
+                  <p:tgtEl>
+                    <p:sldTgt/>
+                  </p:tgtEl>
+                </p:cond>
+              </p:prevCondLst>
+              <p:nextCondLst>
+                <p:cond evt="onNext" delay="0">
+                  <p:tgtEl>
+                    <p:sldTgt/>
+                  </p:tgtEl>
+                </p:cond>
+              </p:nextCondLst>
+            </p:seq>
+          </p:childTnLst>
+        </p:cTn>
+      </p:par>
+    </p:tnLst>
+    <p:bldLst>
+      <p:bldP spid="3" grpId="0" build="p"/>
+    </p:bldLst>
+  </p:timing>
 </p:sld>
 </file>
 
@@ -6256,7 +7329,7 @@
           <a:p>
             <a:r>
               <a:rPr lang="hu-HU" dirty="0" smtClean="0"/>
-              <a:t>Kimenetek</a:t>
+              <a:t>Felbontások</a:t>
             </a:r>
             <a:endParaRPr lang="hu-HU" dirty="0"/>
           </a:p>
@@ -6277,20 +7350,321 @@
           <a:bodyPr/>
           <a:lstStyle/>
           <a:p>
-            <a:endParaRPr lang="hu-HU"/>
+            <a:r>
+              <a:rPr lang="hu-HU" dirty="0" smtClean="0"/>
+              <a:t>1080p (1920x1080px)</a:t>
+            </a:r>
+          </a:p>
+          <a:p>
+            <a:r>
+              <a:rPr lang="hu-HU" dirty="0" smtClean="0"/>
+              <a:t>1440p(2560x1440px)</a:t>
+            </a:r>
+          </a:p>
+          <a:p>
+            <a:r>
+              <a:rPr lang="hu-HU" dirty="0" smtClean="0"/>
+              <a:t>4k (3840x2160px)</a:t>
+            </a:r>
+          </a:p>
+          <a:p>
+            <a:r>
+              <a:rPr lang="hu-HU" dirty="0" smtClean="0"/>
+              <a:t>8k (7680x4320px)</a:t>
+            </a:r>
+          </a:p>
+          <a:p>
+            <a:endParaRPr lang="hu-HU" dirty="0"/>
           </a:p>
         </p:txBody>
       </p:sp>
     </p:spTree>
     <p:extLst>
       <p:ext uri="{BB962C8B-B14F-4D97-AF65-F5344CB8AC3E}">
-        <p14:creationId xmlns:p14="http://schemas.microsoft.com/office/powerpoint/2010/main" val="1801438955"/>
+        <p14:creationId xmlns:p14="http://schemas.microsoft.com/office/powerpoint/2010/main" val="2908472952"/>
       </p:ext>
     </p:extLst>
   </p:cSld>
   <p:clrMapOvr>
     <a:masterClrMapping/>
   </p:clrMapOvr>
+  <p:timing>
+    <p:tnLst>
+      <p:par>
+        <p:cTn id="1" dur="indefinite" restart="never" nodeType="tmRoot">
+          <p:childTnLst>
+            <p:seq concurrent="1" nextAc="seek">
+              <p:cTn id="2" dur="indefinite" nodeType="mainSeq">
+                <p:childTnLst>
+                  <p:par>
+                    <p:cTn id="3" fill="hold">
+                      <p:stCondLst>
+                        <p:cond delay="indefinite"/>
+                      </p:stCondLst>
+                      <p:childTnLst>
+                        <p:par>
+                          <p:cTn id="4" fill="hold">
+                            <p:stCondLst>
+                              <p:cond delay="0"/>
+                            </p:stCondLst>
+                            <p:childTnLst>
+                              <p:par>
+                                <p:cTn id="5" presetID="10" presetClass="entr" presetSubtype="0" fill="hold" grpId="0" nodeType="clickEffect">
+                                  <p:stCondLst>
+                                    <p:cond delay="0"/>
+                                  </p:stCondLst>
+                                  <p:childTnLst>
+                                    <p:set>
+                                      <p:cBhvr>
+                                        <p:cTn id="6" dur="1" fill="hold">
+                                          <p:stCondLst>
+                                            <p:cond delay="0"/>
+                                          </p:stCondLst>
+                                        </p:cTn>
+                                        <p:tgtEl>
+                                          <p:spTgt spid="3">
+                                            <p:txEl>
+                                              <p:pRg st="0" end="0"/>
+                                            </p:txEl>
+                                          </p:spTgt>
+                                        </p:tgtEl>
+                                        <p:attrNameLst>
+                                          <p:attrName>style.visibility</p:attrName>
+                                        </p:attrNameLst>
+                                      </p:cBhvr>
+                                      <p:to>
+                                        <p:strVal val="visible"/>
+                                      </p:to>
+                                    </p:set>
+                                    <p:animEffect transition="in" filter="fade">
+                                      <p:cBhvr>
+                                        <p:cTn id="7" dur="500"/>
+                                        <p:tgtEl>
+                                          <p:spTgt spid="3">
+                                            <p:txEl>
+                                              <p:pRg st="0" end="0"/>
+                                            </p:txEl>
+                                          </p:spTgt>
+                                        </p:tgtEl>
+                                      </p:cBhvr>
+                                    </p:animEffect>
+                                  </p:childTnLst>
+                                </p:cTn>
+                              </p:par>
+                            </p:childTnLst>
+                          </p:cTn>
+                        </p:par>
+                      </p:childTnLst>
+                    </p:cTn>
+                  </p:par>
+                  <p:par>
+                    <p:cTn id="8" fill="hold">
+                      <p:stCondLst>
+                        <p:cond delay="indefinite"/>
+                      </p:stCondLst>
+                      <p:childTnLst>
+                        <p:par>
+                          <p:cTn id="9" fill="hold">
+                            <p:stCondLst>
+                              <p:cond delay="0"/>
+                            </p:stCondLst>
+                            <p:childTnLst>
+                              <p:par>
+                                <p:cTn id="10" presetID="10" presetClass="entr" presetSubtype="0" fill="hold" grpId="0" nodeType="clickEffect">
+                                  <p:stCondLst>
+                                    <p:cond delay="0"/>
+                                  </p:stCondLst>
+                                  <p:childTnLst>
+                                    <p:set>
+                                      <p:cBhvr>
+                                        <p:cTn id="11" dur="1" fill="hold">
+                                          <p:stCondLst>
+                                            <p:cond delay="0"/>
+                                          </p:stCondLst>
+                                        </p:cTn>
+                                        <p:tgtEl>
+                                          <p:spTgt spid="3">
+                                            <p:txEl>
+                                              <p:pRg st="1" end="1"/>
+                                            </p:txEl>
+                                          </p:spTgt>
+                                        </p:tgtEl>
+                                        <p:attrNameLst>
+                                          <p:attrName>style.visibility</p:attrName>
+                                        </p:attrNameLst>
+                                      </p:cBhvr>
+                                      <p:to>
+                                        <p:strVal val="visible"/>
+                                      </p:to>
+                                    </p:set>
+                                    <p:animEffect transition="in" filter="fade">
+                                      <p:cBhvr>
+                                        <p:cTn id="12" dur="500"/>
+                                        <p:tgtEl>
+                                          <p:spTgt spid="3">
+                                            <p:txEl>
+                                              <p:pRg st="1" end="1"/>
+                                            </p:txEl>
+                                          </p:spTgt>
+                                        </p:tgtEl>
+                                      </p:cBhvr>
+                                    </p:animEffect>
+                                  </p:childTnLst>
+                                </p:cTn>
+                              </p:par>
+                            </p:childTnLst>
+                          </p:cTn>
+                        </p:par>
+                      </p:childTnLst>
+                    </p:cTn>
+                  </p:par>
+                  <p:par>
+                    <p:cTn id="13" fill="hold">
+                      <p:stCondLst>
+                        <p:cond delay="indefinite"/>
+                      </p:stCondLst>
+                      <p:childTnLst>
+                        <p:par>
+                          <p:cTn id="14" fill="hold">
+                            <p:stCondLst>
+                              <p:cond delay="0"/>
+                            </p:stCondLst>
+                            <p:childTnLst>
+                              <p:par>
+                                <p:cTn id="15" presetID="10" presetClass="entr" presetSubtype="0" fill="hold" grpId="0" nodeType="clickEffect">
+                                  <p:stCondLst>
+                                    <p:cond delay="0"/>
+                                  </p:stCondLst>
+                                  <p:childTnLst>
+                                    <p:set>
+                                      <p:cBhvr>
+                                        <p:cTn id="16" dur="1" fill="hold">
+                                          <p:stCondLst>
+                                            <p:cond delay="0"/>
+                                          </p:stCondLst>
+                                        </p:cTn>
+                                        <p:tgtEl>
+                                          <p:spTgt spid="3">
+                                            <p:txEl>
+                                              <p:pRg st="2" end="2"/>
+                                            </p:txEl>
+                                          </p:spTgt>
+                                        </p:tgtEl>
+                                        <p:attrNameLst>
+                                          <p:attrName>style.visibility</p:attrName>
+                                        </p:attrNameLst>
+                                      </p:cBhvr>
+                                      <p:to>
+                                        <p:strVal val="visible"/>
+                                      </p:to>
+                                    </p:set>
+                                    <p:animEffect transition="in" filter="fade">
+                                      <p:cBhvr>
+                                        <p:cTn id="17" dur="500"/>
+                                        <p:tgtEl>
+                                          <p:spTgt spid="3">
+                                            <p:txEl>
+                                              <p:pRg st="2" end="2"/>
+                                            </p:txEl>
+                                          </p:spTgt>
+                                        </p:tgtEl>
+                                      </p:cBhvr>
+                                    </p:animEffect>
+                                  </p:childTnLst>
+                                </p:cTn>
+                              </p:par>
+                            </p:childTnLst>
+                          </p:cTn>
+                        </p:par>
+                      </p:childTnLst>
+                    </p:cTn>
+                  </p:par>
+                  <p:par>
+                    <p:cTn id="18" fill="hold">
+                      <p:stCondLst>
+                        <p:cond delay="indefinite"/>
+                      </p:stCondLst>
+                      <p:childTnLst>
+                        <p:par>
+                          <p:cTn id="19" fill="hold">
+                            <p:stCondLst>
+                              <p:cond delay="0"/>
+                            </p:stCondLst>
+                            <p:childTnLst>
+                              <p:par>
+                                <p:cTn id="20" presetID="10" presetClass="entr" presetSubtype="0" fill="hold" grpId="0" nodeType="clickEffect">
+                                  <p:stCondLst>
+                                    <p:cond delay="0"/>
+                                  </p:stCondLst>
+                                  <p:childTnLst>
+                                    <p:set>
+                                      <p:cBhvr>
+                                        <p:cTn id="21" dur="1" fill="hold">
+                                          <p:stCondLst>
+                                            <p:cond delay="0"/>
+                                          </p:stCondLst>
+                                        </p:cTn>
+                                        <p:tgtEl>
+                                          <p:spTgt spid="3">
+                                            <p:txEl>
+                                              <p:pRg st="3" end="3"/>
+                                            </p:txEl>
+                                          </p:spTgt>
+                                        </p:tgtEl>
+                                        <p:attrNameLst>
+                                          <p:attrName>style.visibility</p:attrName>
+                                        </p:attrNameLst>
+                                      </p:cBhvr>
+                                      <p:to>
+                                        <p:strVal val="visible"/>
+                                      </p:to>
+                                    </p:set>
+                                    <p:animEffect transition="in" filter="fade">
+                                      <p:cBhvr>
+                                        <p:cTn id="22" dur="500"/>
+                                        <p:tgtEl>
+                                          <p:spTgt spid="3">
+                                            <p:txEl>
+                                              <p:pRg st="3" end="3"/>
+                                            </p:txEl>
+                                          </p:spTgt>
+                                        </p:tgtEl>
+                                      </p:cBhvr>
+                                    </p:animEffect>
+                                  </p:childTnLst>
+                                </p:cTn>
+                              </p:par>
+                            </p:childTnLst>
+                          </p:cTn>
+                        </p:par>
+                      </p:childTnLst>
+                    </p:cTn>
+                  </p:par>
+                </p:childTnLst>
+              </p:cTn>
+              <p:prevCondLst>
+                <p:cond evt="onPrev" delay="0">
+                  <p:tgtEl>
+                    <p:sldTgt/>
+                  </p:tgtEl>
+                </p:cond>
+              </p:prevCondLst>
+              <p:nextCondLst>
+                <p:cond evt="onNext" delay="0">
+                  <p:tgtEl>
+                    <p:sldTgt/>
+                  </p:tgtEl>
+                </p:cond>
+              </p:nextCondLst>
+            </p:seq>
+          </p:childTnLst>
+        </p:cTn>
+      </p:par>
+    </p:tnLst>
+    <p:bldLst>
+      <p:bldP spid="3" grpId="0" build="p"/>
+    </p:bldLst>
+  </p:timing>
 </p:sld>
 </file>
 
@@ -6327,8 +7701,16 @@
           <a:lstStyle/>
           <a:p>
             <a:r>
-              <a:rPr lang="hu-HU" dirty="0" err="1" smtClean="0"/>
-              <a:t>hertzzz</a:t>
+              <a:rPr lang="hu-HU" dirty="0"/>
+              <a:t>V</a:t>
+            </a:r>
+            <a:r>
+              <a:rPr lang="hu-HU" dirty="0" smtClean="0"/>
+              <a:t>áltozó </a:t>
+            </a:r>
+            <a:r>
+              <a:rPr lang="hu-HU" dirty="0"/>
+              <a:t>frissítési gyakoriság</a:t>
             </a:r>
             <a:endParaRPr lang="hu-HU" dirty="0"/>
           </a:p>
@@ -6346,23 +7728,361 @@
         </p:nvSpPr>
         <p:spPr/>
         <p:txBody>
-          <a:bodyPr/>
+          <a:bodyPr>
+            <a:normAutofit/>
+          </a:bodyPr>
           <a:lstStyle/>
           <a:p>
-            <a:endParaRPr lang="hu-HU"/>
-          </a:p>
-        </p:txBody>
-      </p:sp>
+            <a:r>
+              <a:rPr lang="hu-HU" sz="3200" dirty="0"/>
+              <a:t>V-</a:t>
+            </a:r>
+            <a:r>
+              <a:rPr lang="hu-HU" sz="3200" dirty="0" err="1"/>
+              <a:t>sync</a:t>
+            </a:r>
+            <a:endParaRPr lang="hu-HU" sz="3200" dirty="0"/>
+          </a:p>
+          <a:p>
+            <a:r>
+              <a:rPr lang="hu-HU" sz="3200" dirty="0" smtClean="0"/>
+              <a:t>G-</a:t>
+            </a:r>
+            <a:r>
+              <a:rPr lang="hu-HU" sz="3200" dirty="0" err="1" smtClean="0"/>
+              <a:t>sync</a:t>
+            </a:r>
+            <a:endParaRPr lang="hu-HU" sz="3200" dirty="0" smtClean="0"/>
+          </a:p>
+          <a:p>
+            <a:r>
+              <a:rPr lang="hu-HU" sz="3200" dirty="0" err="1" smtClean="0"/>
+              <a:t>Freesync</a:t>
+            </a:r>
+            <a:endParaRPr lang="hu-HU" sz="3200" dirty="0" smtClean="0"/>
+          </a:p>
+        </p:txBody>
+      </p:sp>
+      <p:pic>
+        <p:nvPicPr>
+          <p:cNvPr id="3074" name="Picture 2" descr="FreeSync vs G-Sync - Which Is Best? [Very Simple] - GPU Mag"/>
+          <p:cNvPicPr>
+            <a:picLocks noChangeAspect="1" noChangeArrowheads="1"/>
+          </p:cNvPicPr>
+          <p:nvPr/>
+        </p:nvPicPr>
+        <p:blipFill>
+          <a:blip r:embed="rId2">
+            <a:extLst>
+              <a:ext uri="{28A0092B-C50C-407E-A947-70E740481C1C}">
+                <a14:useLocalDpi xmlns:a14="http://schemas.microsoft.com/office/drawing/2010/main" val="0"/>
+              </a:ext>
+            </a:extLst>
+          </a:blip>
+          <a:srcRect/>
+          <a:stretch>
+            <a:fillRect/>
+          </a:stretch>
+        </p:blipFill>
+        <p:spPr bwMode="auto">
+          <a:xfrm>
+            <a:off x="5664279" y="1853248"/>
+            <a:ext cx="5312214" cy="3503629"/>
+          </a:xfrm>
+          <a:prstGeom prst="rect">
+            <a:avLst/>
+          </a:prstGeom>
+          <a:noFill/>
+          <a:extLst>
+            <a:ext uri="{909E8E84-426E-40DD-AFC4-6F175D3DCCD1}">
+              <a14:hiddenFill xmlns:a14="http://schemas.microsoft.com/office/drawing/2010/main">
+                <a:solidFill>
+                  <a:srgbClr val="FFFFFF"/>
+                </a:solidFill>
+              </a14:hiddenFill>
+            </a:ext>
+          </a:extLst>
+        </p:spPr>
+      </p:pic>
     </p:spTree>
     <p:extLst>
       <p:ext uri="{BB962C8B-B14F-4D97-AF65-F5344CB8AC3E}">
-        <p14:creationId xmlns:p14="http://schemas.microsoft.com/office/powerpoint/2010/main" val="759364794"/>
+        <p14:creationId xmlns:p14="http://schemas.microsoft.com/office/powerpoint/2010/main" val="2013195211"/>
       </p:ext>
     </p:extLst>
   </p:cSld>
   <p:clrMapOvr>
     <a:masterClrMapping/>
   </p:clrMapOvr>
+  <p:timing>
+    <p:tnLst>
+      <p:par>
+        <p:cTn id="1" dur="indefinite" restart="never" nodeType="tmRoot">
+          <p:childTnLst>
+            <p:seq concurrent="1" nextAc="seek">
+              <p:cTn id="2" dur="indefinite" nodeType="mainSeq">
+                <p:childTnLst>
+                  <p:par>
+                    <p:cTn id="3" fill="hold">
+                      <p:stCondLst>
+                        <p:cond delay="indefinite"/>
+                      </p:stCondLst>
+                      <p:childTnLst>
+                        <p:par>
+                          <p:cTn id="4" fill="hold">
+                            <p:stCondLst>
+                              <p:cond delay="0"/>
+                            </p:stCondLst>
+                            <p:childTnLst>
+                              <p:par>
+                                <p:cTn id="5" presetID="10" presetClass="entr" presetSubtype="0" fill="hold" grpId="0" nodeType="clickEffect">
+                                  <p:stCondLst>
+                                    <p:cond delay="0"/>
+                                  </p:stCondLst>
+                                  <p:childTnLst>
+                                    <p:set>
+                                      <p:cBhvr>
+                                        <p:cTn id="6" dur="1" fill="hold">
+                                          <p:stCondLst>
+                                            <p:cond delay="0"/>
+                                          </p:stCondLst>
+                                        </p:cTn>
+                                        <p:tgtEl>
+                                          <p:spTgt spid="3">
+                                            <p:txEl>
+                                              <p:pRg st="0" end="0"/>
+                                            </p:txEl>
+                                          </p:spTgt>
+                                        </p:tgtEl>
+                                        <p:attrNameLst>
+                                          <p:attrName>style.visibility</p:attrName>
+                                        </p:attrNameLst>
+                                      </p:cBhvr>
+                                      <p:to>
+                                        <p:strVal val="visible"/>
+                                      </p:to>
+                                    </p:set>
+                                    <p:animEffect transition="in" filter="fade">
+                                      <p:cBhvr>
+                                        <p:cTn id="7" dur="500"/>
+                                        <p:tgtEl>
+                                          <p:spTgt spid="3">
+                                            <p:txEl>
+                                              <p:pRg st="0" end="0"/>
+                                            </p:txEl>
+                                          </p:spTgt>
+                                        </p:tgtEl>
+                                      </p:cBhvr>
+                                    </p:animEffect>
+                                  </p:childTnLst>
+                                </p:cTn>
+                              </p:par>
+                            </p:childTnLst>
+                          </p:cTn>
+                        </p:par>
+                      </p:childTnLst>
+                    </p:cTn>
+                  </p:par>
+                  <p:par>
+                    <p:cTn id="8" fill="hold">
+                      <p:stCondLst>
+                        <p:cond delay="indefinite"/>
+                      </p:stCondLst>
+                      <p:childTnLst>
+                        <p:par>
+                          <p:cTn id="9" fill="hold">
+                            <p:stCondLst>
+                              <p:cond delay="0"/>
+                            </p:stCondLst>
+                            <p:childTnLst>
+                              <p:par>
+                                <p:cTn id="10" presetID="10" presetClass="entr" presetSubtype="0" fill="hold" grpId="0" nodeType="clickEffect">
+                                  <p:stCondLst>
+                                    <p:cond delay="0"/>
+                                  </p:stCondLst>
+                                  <p:childTnLst>
+                                    <p:set>
+                                      <p:cBhvr>
+                                        <p:cTn id="11" dur="1" fill="hold">
+                                          <p:stCondLst>
+                                            <p:cond delay="0"/>
+                                          </p:stCondLst>
+                                        </p:cTn>
+                                        <p:tgtEl>
+                                          <p:spTgt spid="3">
+                                            <p:txEl>
+                                              <p:pRg st="1" end="1"/>
+                                            </p:txEl>
+                                          </p:spTgt>
+                                        </p:tgtEl>
+                                        <p:attrNameLst>
+                                          <p:attrName>style.visibility</p:attrName>
+                                        </p:attrNameLst>
+                                      </p:cBhvr>
+                                      <p:to>
+                                        <p:strVal val="visible"/>
+                                      </p:to>
+                                    </p:set>
+                                    <p:animEffect transition="in" filter="fade">
+                                      <p:cBhvr>
+                                        <p:cTn id="12" dur="500"/>
+                                        <p:tgtEl>
+                                          <p:spTgt spid="3">
+                                            <p:txEl>
+                                              <p:pRg st="1" end="1"/>
+                                            </p:txEl>
+                                          </p:spTgt>
+                                        </p:tgtEl>
+                                      </p:cBhvr>
+                                    </p:animEffect>
+                                  </p:childTnLst>
+                                </p:cTn>
+                              </p:par>
+                            </p:childTnLst>
+                          </p:cTn>
+                        </p:par>
+                      </p:childTnLst>
+                    </p:cTn>
+                  </p:par>
+                  <p:par>
+                    <p:cTn id="13" fill="hold">
+                      <p:stCondLst>
+                        <p:cond delay="indefinite"/>
+                      </p:stCondLst>
+                      <p:childTnLst>
+                        <p:par>
+                          <p:cTn id="14" fill="hold">
+                            <p:stCondLst>
+                              <p:cond delay="0"/>
+                            </p:stCondLst>
+                            <p:childTnLst>
+                              <p:par>
+                                <p:cTn id="15" presetID="10" presetClass="entr" presetSubtype="0" fill="hold" grpId="0" nodeType="clickEffect">
+                                  <p:stCondLst>
+                                    <p:cond delay="0"/>
+                                  </p:stCondLst>
+                                  <p:childTnLst>
+                                    <p:set>
+                                      <p:cBhvr>
+                                        <p:cTn id="16" dur="1" fill="hold">
+                                          <p:stCondLst>
+                                            <p:cond delay="0"/>
+                                          </p:stCondLst>
+                                        </p:cTn>
+                                        <p:tgtEl>
+                                          <p:spTgt spid="3">
+                                            <p:txEl>
+                                              <p:pRg st="2" end="2"/>
+                                            </p:txEl>
+                                          </p:spTgt>
+                                        </p:tgtEl>
+                                        <p:attrNameLst>
+                                          <p:attrName>style.visibility</p:attrName>
+                                        </p:attrNameLst>
+                                      </p:cBhvr>
+                                      <p:to>
+                                        <p:strVal val="visible"/>
+                                      </p:to>
+                                    </p:set>
+                                    <p:animEffect transition="in" filter="fade">
+                                      <p:cBhvr>
+                                        <p:cTn id="17" dur="500"/>
+                                        <p:tgtEl>
+                                          <p:spTgt spid="3">
+                                            <p:txEl>
+                                              <p:pRg st="2" end="2"/>
+                                            </p:txEl>
+                                          </p:spTgt>
+                                        </p:tgtEl>
+                                      </p:cBhvr>
+                                    </p:animEffect>
+                                  </p:childTnLst>
+                                </p:cTn>
+                              </p:par>
+                            </p:childTnLst>
+                          </p:cTn>
+                        </p:par>
+                      </p:childTnLst>
+                    </p:cTn>
+                  </p:par>
+                  <p:par>
+                    <p:cTn id="18" fill="hold">
+                      <p:stCondLst>
+                        <p:cond delay="indefinite"/>
+                      </p:stCondLst>
+                      <p:childTnLst>
+                        <p:par>
+                          <p:cTn id="19" fill="hold">
+                            <p:stCondLst>
+                              <p:cond delay="0"/>
+                            </p:stCondLst>
+                            <p:childTnLst>
+                              <p:par>
+                                <p:cTn id="20" presetID="10" presetClass="entr" presetSubtype="0" fill="hold" nodeType="clickEffect">
+                                  <p:stCondLst>
+                                    <p:cond delay="0"/>
+                                  </p:stCondLst>
+                                  <p:childTnLst>
+                                    <p:set>
+                                      <p:cBhvr>
+                                        <p:cTn id="21" dur="1" fill="hold">
+                                          <p:stCondLst>
+                                            <p:cond delay="0"/>
+                                          </p:stCondLst>
+                                        </p:cTn>
+                                        <p:tgtEl>
+                                          <p:spTgt spid="3074"/>
+                                        </p:tgtEl>
+                                        <p:attrNameLst>
+                                          <p:attrName>style.visibility</p:attrName>
+                                        </p:attrNameLst>
+                                      </p:cBhvr>
+                                      <p:to>
+                                        <p:strVal val="visible"/>
+                                      </p:to>
+                                    </p:set>
+                                    <p:animEffect transition="in" filter="fade">
+                                      <p:cBhvr>
+                                        <p:cTn id="22" dur="500"/>
+                                        <p:tgtEl>
+                                          <p:spTgt spid="3074"/>
+                                        </p:tgtEl>
+                                      </p:cBhvr>
+                                    </p:animEffect>
+                                  </p:childTnLst>
+                                </p:cTn>
+                              </p:par>
+                            </p:childTnLst>
+                          </p:cTn>
+                        </p:par>
+                      </p:childTnLst>
+                    </p:cTn>
+                  </p:par>
+                </p:childTnLst>
+              </p:cTn>
+              <p:prevCondLst>
+                <p:cond evt="onPrev" delay="0">
+                  <p:tgtEl>
+                    <p:sldTgt/>
+                  </p:tgtEl>
+                </p:cond>
+              </p:prevCondLst>
+              <p:nextCondLst>
+                <p:cond evt="onNext" delay="0">
+                  <p:tgtEl>
+                    <p:sldTgt/>
+                  </p:tgtEl>
+                </p:cond>
+              </p:nextCondLst>
+            </p:seq>
+          </p:childTnLst>
+        </p:cTn>
+      </p:par>
+    </p:tnLst>
+    <p:bldLst>
+      <p:bldP spid="3" grpId="0" build="p"/>
+    </p:bldLst>
+  </p:timing>
 </p:sld>
 </file>
 
@@ -6399,14 +8119,9 @@
           <a:lstStyle/>
           <a:p>
             <a:r>
-              <a:rPr lang="hu-HU" dirty="0" smtClean="0"/>
-              <a:t>G-</a:t>
-            </a:r>
-            <a:r>
-              <a:rPr lang="hu-HU" dirty="0" err="1" smtClean="0"/>
-              <a:t>sync</a:t>
-            </a:r>
-            <a:endParaRPr lang="hu-HU" dirty="0"/>
+              <a:rPr lang="hu-HU" dirty="0"/>
+              <a:t>Egyebek</a:t>
+            </a:r>
           </a:p>
         </p:txBody>
       </p:sp>
@@ -6425,20 +8140,542 @@
           <a:bodyPr/>
           <a:lstStyle/>
           <a:p>
-            <a:endParaRPr lang="hu-HU"/>
-          </a:p>
-        </p:txBody>
-      </p:sp>
+            <a:r>
+              <a:rPr lang="hu-HU" dirty="0" smtClean="0"/>
+              <a:t>USB </a:t>
+            </a:r>
+            <a:r>
+              <a:rPr lang="hu-HU" dirty="0" err="1" smtClean="0"/>
+              <a:t>hub</a:t>
+            </a:r>
+            <a:endParaRPr lang="hu-HU" dirty="0" smtClean="0"/>
+          </a:p>
+          <a:p>
+            <a:r>
+              <a:rPr lang="hu-HU" dirty="0" smtClean="0"/>
+              <a:t>RGB világítás</a:t>
+            </a:r>
+          </a:p>
+          <a:p>
+            <a:r>
+              <a:rPr lang="hu-HU" dirty="0" smtClean="0"/>
+              <a:t>Ívelt kijelző</a:t>
+            </a:r>
+          </a:p>
+          <a:p>
+            <a:r>
+              <a:rPr lang="hu-HU" dirty="0" smtClean="0"/>
+              <a:t>Hangszóró</a:t>
+            </a:r>
+          </a:p>
+          <a:p>
+            <a:endParaRPr lang="hu-HU" dirty="0"/>
+          </a:p>
+        </p:txBody>
+      </p:sp>
+      <p:pic>
+        <p:nvPicPr>
+          <p:cNvPr id="2050" name="Picture 2" descr="táska Teljesítmény Gladys aoc 27g2u usb hub Fém vonal ékszerek vihar"/>
+          <p:cNvPicPr>
+            <a:picLocks noChangeAspect="1" noChangeArrowheads="1"/>
+          </p:cNvPicPr>
+          <p:nvPr/>
+        </p:nvPicPr>
+        <p:blipFill>
+          <a:blip r:embed="rId2">
+            <a:extLst>
+              <a:ext uri="{28A0092B-C50C-407E-A947-70E740481C1C}">
+                <a14:useLocalDpi xmlns:a14="http://schemas.microsoft.com/office/drawing/2010/main" val="0"/>
+              </a:ext>
+            </a:extLst>
+          </a:blip>
+          <a:srcRect/>
+          <a:stretch>
+            <a:fillRect/>
+          </a:stretch>
+        </p:blipFill>
+        <p:spPr bwMode="auto">
+          <a:xfrm>
+            <a:off x="5348472" y="1350807"/>
+            <a:ext cx="5715000" cy="1857376"/>
+          </a:xfrm>
+          <a:prstGeom prst="rect">
+            <a:avLst/>
+          </a:prstGeom>
+          <a:solidFill>
+            <a:srgbClr val="FFFFFF">
+              <a:shade val="85000"/>
+            </a:srgbClr>
+          </a:solidFill>
+          <a:ln w="190500" cap="rnd">
+            <a:solidFill>
+              <a:srgbClr val="FFFFFF"/>
+            </a:solidFill>
+          </a:ln>
+          <a:effectLst>
+            <a:outerShdw blurRad="50000" algn="tl" rotWithShape="0">
+              <a:srgbClr val="000000">
+                <a:alpha val="41000"/>
+              </a:srgbClr>
+            </a:outerShdw>
+          </a:effectLst>
+          <a:scene3d>
+            <a:camera prst="orthographicFront"/>
+            <a:lightRig rig="twoPt" dir="t">
+              <a:rot lat="0" lon="0" rev="7800000"/>
+            </a:lightRig>
+          </a:scene3d>
+          <a:sp3d contourW="6350">
+            <a:bevelT w="50800" h="16510"/>
+            <a:contourClr>
+              <a:srgbClr val="C0C0C0"/>
+            </a:contourClr>
+          </a:sp3d>
+          <a:extLst>
+            <a:ext uri="{909E8E84-426E-40DD-AFC4-6F175D3DCCD1}">
+              <a14:hiddenFill xmlns:a14="http://schemas.microsoft.com/office/drawing/2010/main">
+                <a:solidFill>
+                  <a:srgbClr val="FFFFFF"/>
+                </a:solidFill>
+              </a14:hiddenFill>
+            </a:ext>
+          </a:extLst>
+        </p:spPr>
+      </p:pic>
+      <p:pic>
+        <p:nvPicPr>
+          <p:cNvPr id="2052" name="Picture 4" descr="Samsung now makes ultra-curved monitors for offices as well as gamers - The  Verge"/>
+          <p:cNvPicPr>
+            <a:picLocks noChangeAspect="1" noChangeArrowheads="1"/>
+          </p:cNvPicPr>
+          <p:nvPr/>
+        </p:nvPicPr>
+        <p:blipFill>
+          <a:blip r:embed="rId3">
+            <a:extLst>
+              <a:ext uri="{28A0092B-C50C-407E-A947-70E740481C1C}">
+                <a14:useLocalDpi xmlns:a14="http://schemas.microsoft.com/office/drawing/2010/main" val="0"/>
+              </a:ext>
+            </a:extLst>
+          </a:blip>
+          <a:srcRect/>
+          <a:stretch>
+            <a:fillRect/>
+          </a:stretch>
+        </p:blipFill>
+        <p:spPr bwMode="auto">
+          <a:xfrm>
+            <a:off x="6074443" y="3590691"/>
+            <a:ext cx="3975410" cy="2981557"/>
+          </a:xfrm>
+          <a:prstGeom prst="rect">
+            <a:avLst/>
+          </a:prstGeom>
+          <a:noFill/>
+          <a:extLst>
+            <a:ext uri="{909E8E84-426E-40DD-AFC4-6F175D3DCCD1}">
+              <a14:hiddenFill xmlns:a14="http://schemas.microsoft.com/office/drawing/2010/main">
+                <a:solidFill>
+                  <a:srgbClr val="FFFFFF"/>
+                </a:solidFill>
+              </a14:hiddenFill>
+            </a:ext>
+          </a:extLst>
+        </p:spPr>
+      </p:pic>
     </p:spTree>
     <p:extLst>
       <p:ext uri="{BB962C8B-B14F-4D97-AF65-F5344CB8AC3E}">
-        <p14:creationId xmlns:p14="http://schemas.microsoft.com/office/powerpoint/2010/main" val="2013195211"/>
+        <p14:creationId xmlns:p14="http://schemas.microsoft.com/office/powerpoint/2010/main" val="3416009249"/>
       </p:ext>
     </p:extLst>
   </p:cSld>
   <p:clrMapOvr>
     <a:masterClrMapping/>
   </p:clrMapOvr>
+  <p:timing>
+    <p:tnLst>
+      <p:par>
+        <p:cTn id="1" dur="indefinite" restart="never" nodeType="tmRoot">
+          <p:childTnLst>
+            <p:seq concurrent="1" nextAc="seek">
+              <p:cTn id="2" dur="indefinite" nodeType="mainSeq">
+                <p:childTnLst>
+                  <p:par>
+                    <p:cTn id="3" fill="hold">
+                      <p:stCondLst>
+                        <p:cond delay="indefinite"/>
+                      </p:stCondLst>
+                      <p:childTnLst>
+                        <p:par>
+                          <p:cTn id="4" fill="hold">
+                            <p:stCondLst>
+                              <p:cond delay="0"/>
+                            </p:stCondLst>
+                            <p:childTnLst>
+                              <p:par>
+                                <p:cTn id="5" presetID="10" presetClass="entr" presetSubtype="0" fill="hold" grpId="0" nodeType="clickEffect">
+                                  <p:stCondLst>
+                                    <p:cond delay="0"/>
+                                  </p:stCondLst>
+                                  <p:childTnLst>
+                                    <p:set>
+                                      <p:cBhvr>
+                                        <p:cTn id="6" dur="1" fill="hold">
+                                          <p:stCondLst>
+                                            <p:cond delay="0"/>
+                                          </p:stCondLst>
+                                        </p:cTn>
+                                        <p:tgtEl>
+                                          <p:spTgt spid="3">
+                                            <p:txEl>
+                                              <p:pRg st="0" end="0"/>
+                                            </p:txEl>
+                                          </p:spTgt>
+                                        </p:tgtEl>
+                                        <p:attrNameLst>
+                                          <p:attrName>style.visibility</p:attrName>
+                                        </p:attrNameLst>
+                                      </p:cBhvr>
+                                      <p:to>
+                                        <p:strVal val="visible"/>
+                                      </p:to>
+                                    </p:set>
+                                    <p:animEffect transition="in" filter="fade">
+                                      <p:cBhvr>
+                                        <p:cTn id="7" dur="500"/>
+                                        <p:tgtEl>
+                                          <p:spTgt spid="3">
+                                            <p:txEl>
+                                              <p:pRg st="0" end="0"/>
+                                            </p:txEl>
+                                          </p:spTgt>
+                                        </p:tgtEl>
+                                      </p:cBhvr>
+                                    </p:animEffect>
+                                  </p:childTnLst>
+                                </p:cTn>
+                              </p:par>
+                            </p:childTnLst>
+                          </p:cTn>
+                        </p:par>
+                      </p:childTnLst>
+                    </p:cTn>
+                  </p:par>
+                  <p:par>
+                    <p:cTn id="8" fill="hold">
+                      <p:stCondLst>
+                        <p:cond delay="indefinite"/>
+                      </p:stCondLst>
+                      <p:childTnLst>
+                        <p:par>
+                          <p:cTn id="9" fill="hold">
+                            <p:stCondLst>
+                              <p:cond delay="0"/>
+                            </p:stCondLst>
+                            <p:childTnLst>
+                              <p:par>
+                                <p:cTn id="10" presetID="10" presetClass="entr" presetSubtype="0" fill="hold" grpId="0" nodeType="clickEffect">
+                                  <p:stCondLst>
+                                    <p:cond delay="0"/>
+                                  </p:stCondLst>
+                                  <p:childTnLst>
+                                    <p:set>
+                                      <p:cBhvr>
+                                        <p:cTn id="11" dur="1" fill="hold">
+                                          <p:stCondLst>
+                                            <p:cond delay="0"/>
+                                          </p:stCondLst>
+                                        </p:cTn>
+                                        <p:tgtEl>
+                                          <p:spTgt spid="3">
+                                            <p:txEl>
+                                              <p:pRg st="1" end="1"/>
+                                            </p:txEl>
+                                          </p:spTgt>
+                                        </p:tgtEl>
+                                        <p:attrNameLst>
+                                          <p:attrName>style.visibility</p:attrName>
+                                        </p:attrNameLst>
+                                      </p:cBhvr>
+                                      <p:to>
+                                        <p:strVal val="visible"/>
+                                      </p:to>
+                                    </p:set>
+                                    <p:animEffect transition="in" filter="fade">
+                                      <p:cBhvr>
+                                        <p:cTn id="12" dur="500"/>
+                                        <p:tgtEl>
+                                          <p:spTgt spid="3">
+                                            <p:txEl>
+                                              <p:pRg st="1" end="1"/>
+                                            </p:txEl>
+                                          </p:spTgt>
+                                        </p:tgtEl>
+                                      </p:cBhvr>
+                                    </p:animEffect>
+                                  </p:childTnLst>
+                                </p:cTn>
+                              </p:par>
+                            </p:childTnLst>
+                          </p:cTn>
+                        </p:par>
+                      </p:childTnLst>
+                    </p:cTn>
+                  </p:par>
+                  <p:par>
+                    <p:cTn id="13" fill="hold">
+                      <p:stCondLst>
+                        <p:cond delay="indefinite"/>
+                      </p:stCondLst>
+                      <p:childTnLst>
+                        <p:par>
+                          <p:cTn id="14" fill="hold">
+                            <p:stCondLst>
+                              <p:cond delay="0"/>
+                            </p:stCondLst>
+                            <p:childTnLst>
+                              <p:par>
+                                <p:cTn id="15" presetID="10" presetClass="entr" presetSubtype="0" fill="hold" grpId="0" nodeType="clickEffect">
+                                  <p:stCondLst>
+                                    <p:cond delay="0"/>
+                                  </p:stCondLst>
+                                  <p:childTnLst>
+                                    <p:set>
+                                      <p:cBhvr>
+                                        <p:cTn id="16" dur="1" fill="hold">
+                                          <p:stCondLst>
+                                            <p:cond delay="0"/>
+                                          </p:stCondLst>
+                                        </p:cTn>
+                                        <p:tgtEl>
+                                          <p:spTgt spid="3">
+                                            <p:txEl>
+                                              <p:pRg st="2" end="2"/>
+                                            </p:txEl>
+                                          </p:spTgt>
+                                        </p:tgtEl>
+                                        <p:attrNameLst>
+                                          <p:attrName>style.visibility</p:attrName>
+                                        </p:attrNameLst>
+                                      </p:cBhvr>
+                                      <p:to>
+                                        <p:strVal val="visible"/>
+                                      </p:to>
+                                    </p:set>
+                                    <p:animEffect transition="in" filter="fade">
+                                      <p:cBhvr>
+                                        <p:cTn id="17" dur="500"/>
+                                        <p:tgtEl>
+                                          <p:spTgt spid="3">
+                                            <p:txEl>
+                                              <p:pRg st="2" end="2"/>
+                                            </p:txEl>
+                                          </p:spTgt>
+                                        </p:tgtEl>
+                                      </p:cBhvr>
+                                    </p:animEffect>
+                                  </p:childTnLst>
+                                </p:cTn>
+                              </p:par>
+                            </p:childTnLst>
+                          </p:cTn>
+                        </p:par>
+                      </p:childTnLst>
+                    </p:cTn>
+                  </p:par>
+                  <p:par>
+                    <p:cTn id="18" fill="hold">
+                      <p:stCondLst>
+                        <p:cond delay="indefinite"/>
+                      </p:stCondLst>
+                      <p:childTnLst>
+                        <p:par>
+                          <p:cTn id="19" fill="hold">
+                            <p:stCondLst>
+                              <p:cond delay="0"/>
+                            </p:stCondLst>
+                            <p:childTnLst>
+                              <p:par>
+                                <p:cTn id="20" presetID="10" presetClass="entr" presetSubtype="0" fill="hold" grpId="0" nodeType="clickEffect">
+                                  <p:stCondLst>
+                                    <p:cond delay="0"/>
+                                  </p:stCondLst>
+                                  <p:childTnLst>
+                                    <p:set>
+                                      <p:cBhvr>
+                                        <p:cTn id="21" dur="1" fill="hold">
+                                          <p:stCondLst>
+                                            <p:cond delay="0"/>
+                                          </p:stCondLst>
+                                        </p:cTn>
+                                        <p:tgtEl>
+                                          <p:spTgt spid="3">
+                                            <p:txEl>
+                                              <p:pRg st="3" end="3"/>
+                                            </p:txEl>
+                                          </p:spTgt>
+                                        </p:tgtEl>
+                                        <p:attrNameLst>
+                                          <p:attrName>style.visibility</p:attrName>
+                                        </p:attrNameLst>
+                                      </p:cBhvr>
+                                      <p:to>
+                                        <p:strVal val="visible"/>
+                                      </p:to>
+                                    </p:set>
+                                    <p:animEffect transition="in" filter="fade">
+                                      <p:cBhvr>
+                                        <p:cTn id="22" dur="500"/>
+                                        <p:tgtEl>
+                                          <p:spTgt spid="3">
+                                            <p:txEl>
+                                              <p:pRg st="3" end="3"/>
+                                            </p:txEl>
+                                          </p:spTgt>
+                                        </p:tgtEl>
+                                      </p:cBhvr>
+                                    </p:animEffect>
+                                  </p:childTnLst>
+                                </p:cTn>
+                              </p:par>
+                            </p:childTnLst>
+                          </p:cTn>
+                        </p:par>
+                      </p:childTnLst>
+                    </p:cTn>
+                  </p:par>
+                  <p:par>
+                    <p:cTn id="23" fill="hold">
+                      <p:stCondLst>
+                        <p:cond delay="indefinite"/>
+                      </p:stCondLst>
+                      <p:childTnLst>
+                        <p:par>
+                          <p:cTn id="24" fill="hold">
+                            <p:stCondLst>
+                              <p:cond delay="0"/>
+                            </p:stCondLst>
+                            <p:childTnLst>
+                              <p:par>
+                                <p:cTn id="25" presetID="10" presetClass="entr" presetSubtype="0" fill="hold" nodeType="clickEffect">
+                                  <p:stCondLst>
+                                    <p:cond delay="0"/>
+                                  </p:stCondLst>
+                                  <p:childTnLst>
+                                    <p:set>
+                                      <p:cBhvr>
+                                        <p:cTn id="26" dur="1" fill="hold">
+                                          <p:stCondLst>
+                                            <p:cond delay="0"/>
+                                          </p:stCondLst>
+                                        </p:cTn>
+                                        <p:tgtEl>
+                                          <p:spTgt spid="2050"/>
+                                        </p:tgtEl>
+                                        <p:attrNameLst>
+                                          <p:attrName>style.visibility</p:attrName>
+                                        </p:attrNameLst>
+                                      </p:cBhvr>
+                                      <p:to>
+                                        <p:strVal val="visible"/>
+                                      </p:to>
+                                    </p:set>
+                                    <p:animEffect transition="in" filter="fade">
+                                      <p:cBhvr>
+                                        <p:cTn id="27" dur="500"/>
+                                        <p:tgtEl>
+                                          <p:spTgt spid="2050"/>
+                                        </p:tgtEl>
+                                      </p:cBhvr>
+                                    </p:animEffect>
+                                  </p:childTnLst>
+                                </p:cTn>
+                              </p:par>
+                            </p:childTnLst>
+                          </p:cTn>
+                        </p:par>
+                      </p:childTnLst>
+                    </p:cTn>
+                  </p:par>
+                  <p:par>
+                    <p:cTn id="28" fill="hold">
+                      <p:stCondLst>
+                        <p:cond delay="indefinite"/>
+                      </p:stCondLst>
+                      <p:childTnLst>
+                        <p:par>
+                          <p:cTn id="29" fill="hold">
+                            <p:stCondLst>
+                              <p:cond delay="0"/>
+                            </p:stCondLst>
+                            <p:childTnLst>
+                              <p:par>
+                                <p:cTn id="30" presetID="10" presetClass="entr" presetSubtype="0" fill="hold" nodeType="clickEffect">
+                                  <p:stCondLst>
+                                    <p:cond delay="0"/>
+                                  </p:stCondLst>
+                                  <p:childTnLst>
+                                    <p:set>
+                                      <p:cBhvr>
+                                        <p:cTn id="31" dur="1" fill="hold">
+                                          <p:stCondLst>
+                                            <p:cond delay="0"/>
+                                          </p:stCondLst>
+                                        </p:cTn>
+                                        <p:tgtEl>
+                                          <p:spTgt spid="2052"/>
+                                        </p:tgtEl>
+                                        <p:attrNameLst>
+                                          <p:attrName>style.visibility</p:attrName>
+                                        </p:attrNameLst>
+                                      </p:cBhvr>
+                                      <p:to>
+                                        <p:strVal val="visible"/>
+                                      </p:to>
+                                    </p:set>
+                                    <p:animEffect transition="in" filter="fade">
+                                      <p:cBhvr>
+                                        <p:cTn id="32" dur="500"/>
+                                        <p:tgtEl>
+                                          <p:spTgt spid="2052"/>
+                                        </p:tgtEl>
+                                      </p:cBhvr>
+                                    </p:animEffect>
+                                  </p:childTnLst>
+                                </p:cTn>
+                              </p:par>
+                            </p:childTnLst>
+                          </p:cTn>
+                        </p:par>
+                      </p:childTnLst>
+                    </p:cTn>
+                  </p:par>
+                </p:childTnLst>
+              </p:cTn>
+              <p:prevCondLst>
+                <p:cond evt="onPrev" delay="0">
+                  <p:tgtEl>
+                    <p:sldTgt/>
+                  </p:tgtEl>
+                </p:cond>
+              </p:prevCondLst>
+              <p:nextCondLst>
+                <p:cond evt="onNext" delay="0">
+                  <p:tgtEl>
+                    <p:sldTgt/>
+                  </p:tgtEl>
+                </p:cond>
+              </p:nextCondLst>
+            </p:seq>
+          </p:childTnLst>
+        </p:cTn>
+      </p:par>
+    </p:tnLst>
+    <p:bldLst>
+      <p:bldP spid="3" grpId="0" build="p"/>
+    </p:bldLst>
+  </p:timing>
 </p:sld>
 </file>
 
@@ -6469,30 +8706,150 @@
             <p:ph type="title"/>
           </p:nvPr>
         </p:nvSpPr>
-        <p:spPr>
-          <a:xfrm>
-            <a:off x="4849811" y="3335618"/>
-            <a:ext cx="4192589" cy="1325282"/>
-          </a:xfrm>
-        </p:spPr>
+        <p:spPr/>
         <p:txBody>
           <a:bodyPr/>
           <a:lstStyle/>
           <a:p>
+            <a:r>
+              <a:rPr lang="hu-HU" dirty="0" smtClean="0"/>
+              <a:t>Források</a:t>
+            </a:r>
             <a:endParaRPr lang="hu-HU" dirty="0"/>
+          </a:p>
+        </p:txBody>
+      </p:sp>
+      <p:sp>
+        <p:nvSpPr>
+          <p:cNvPr id="3" name="Tartalom helye 2"/>
+          <p:cNvSpPr>
+            <a:spLocks noGrp="1"/>
+          </p:cNvSpPr>
+          <p:nvPr>
+            <p:ph idx="1"/>
+          </p:nvPr>
+        </p:nvSpPr>
+        <p:spPr/>
+        <p:txBody>
+          <a:bodyPr/>
+          <a:lstStyle/>
+          <a:p>
+            <a:r>
+              <a:rPr lang="hu-HU" dirty="0">
+                <a:hlinkClick r:id="rId2"/>
+              </a:rPr>
+              <a:t>https://polymoa.wordpress.com/2019/02/08/169-resolutions-chart</a:t>
+            </a:r>
+            <a:r>
+              <a:rPr lang="hu-HU" dirty="0" smtClean="0">
+                <a:hlinkClick r:id="rId2"/>
+              </a:rPr>
+              <a:t>/</a:t>
+            </a:r>
+            <a:endParaRPr lang="hu-HU" dirty="0" smtClean="0"/>
+          </a:p>
+          <a:p>
+            <a:r>
+              <a:rPr lang="hu-HU" dirty="0">
+                <a:hlinkClick r:id="rId3"/>
+              </a:rPr>
+              <a:t>https://www.pcgamer.com/asus-rog-swift-500hz-gaming-monitor</a:t>
+            </a:r>
+            <a:r>
+              <a:rPr lang="hu-HU" dirty="0" smtClean="0">
+                <a:hlinkClick r:id="rId3"/>
+              </a:rPr>
+              <a:t>/</a:t>
+            </a:r>
+            <a:endParaRPr lang="hu-HU" dirty="0" smtClean="0"/>
+          </a:p>
+          <a:p>
+            <a:endParaRPr lang="hu-HU" dirty="0" smtClean="0"/>
           </a:p>
         </p:txBody>
       </p:sp>
     </p:spTree>
     <p:extLst>
       <p:ext uri="{BB962C8B-B14F-4D97-AF65-F5344CB8AC3E}">
-        <p14:creationId xmlns:p14="http://schemas.microsoft.com/office/powerpoint/2010/main" val="1746285200"/>
+        <p14:creationId xmlns:p14="http://schemas.microsoft.com/office/powerpoint/2010/main" val="4109972850"/>
       </p:ext>
     </p:extLst>
   </p:cSld>
   <p:clrMapOvr>
     <a:masterClrMapping/>
   </p:clrMapOvr>
+  <p:timing>
+    <p:tnLst>
+      <p:par>
+        <p:cTn id="1" dur="indefinite" restart="never" nodeType="tmRoot"/>
+      </p:par>
+    </p:tnLst>
+  </p:timing>
+</p:sld>
+</file>
+
+<file path=ppt/slides/slide8.xml><?xml version="1.0" encoding="utf-8"?>
+<p:sld xmlns:a="http://schemas.openxmlformats.org/drawingml/2006/main" xmlns:r="http://schemas.openxmlformats.org/officeDocument/2006/relationships" xmlns:p="http://schemas.openxmlformats.org/presentationml/2006/main">
+  <p:cSld>
+    <p:spTree>
+      <p:nvGrpSpPr>
+        <p:cNvPr id="1" name=""/>
+        <p:cNvGrpSpPr/>
+        <p:nvPr/>
+      </p:nvGrpSpPr>
+      <p:grpSpPr>
+        <a:xfrm>
+          <a:off x="0" y="0"/>
+          <a:ext cx="0" cy="0"/>
+          <a:chOff x="0" y="0"/>
+          <a:chExt cx="0" cy="0"/>
+        </a:xfrm>
+      </p:grpSpPr>
+      <p:sp>
+        <p:nvSpPr>
+          <p:cNvPr id="2" name="Cím 1"/>
+          <p:cNvSpPr>
+            <a:spLocks noGrp="1"/>
+          </p:cNvSpPr>
+          <p:nvPr>
+            <p:ph type="title"/>
+          </p:nvPr>
+        </p:nvSpPr>
+        <p:spPr>
+          <a:xfrm>
+            <a:off x="3083449" y="3034385"/>
+            <a:ext cx="6234191" cy="740462"/>
+          </a:xfrm>
+        </p:spPr>
+        <p:txBody>
+          <a:bodyPr/>
+          <a:lstStyle/>
+          <a:p>
+            <a:r>
+              <a:rPr lang="hu-HU" sz="4000" dirty="0" smtClean="0"/>
+              <a:t>Köszönöm a figyelmet!</a:t>
+            </a:r>
+            <a:endParaRPr lang="hu-HU" sz="4000" dirty="0"/>
+          </a:p>
+        </p:txBody>
+      </p:sp>
+    </p:spTree>
+    <p:extLst>
+      <p:ext uri="{BB962C8B-B14F-4D97-AF65-F5344CB8AC3E}">
+        <p14:creationId xmlns:p14="http://schemas.microsoft.com/office/powerpoint/2010/main" val="1634896888"/>
+      </p:ext>
+    </p:extLst>
+  </p:cSld>
+  <p:clrMapOvr>
+    <a:masterClrMapping/>
+  </p:clrMapOvr>
+  <p:timing>
+    <p:tnLst>
+      <p:par>
+        <p:cTn id="1" dur="indefinite" restart="never" nodeType="tmRoot"/>
+      </p:par>
+    </p:tnLst>
+  </p:timing>
 </p:sld>
 </file>
 

</xml_diff>

<commit_message>
ppt készítése (majdnem kész)
</commit_message>
<xml_diff>
--- a/Monitorok.pptx
+++ b/Monitorok.pptx
@@ -305,7 +305,7 @@
           <a:p>
             <a:fld id="{4AAD347D-5ACD-4C99-B74B-A9C85AD731AF}" type="datetimeFigureOut">
               <a:rPr lang="en-US" smtClean="0"/>
-              <a:t>9/15/2022</a:t>
+              <a:t>9/19/2022</a:t>
             </a:fld>
             <a:endParaRPr lang="en-US" dirty="0"/>
           </a:p>
@@ -580,7 +580,7 @@
           <a:p>
             <a:fld id="{4AAD347D-5ACD-4C99-B74B-A9C85AD731AF}" type="datetimeFigureOut">
               <a:rPr lang="en-US" smtClean="0"/>
-              <a:t>9/15/2022</a:t>
+              <a:t>9/19/2022</a:t>
             </a:fld>
             <a:endParaRPr lang="en-US" dirty="0"/>
           </a:p>
@@ -775,7 +775,7 @@
           <a:p>
             <a:fld id="{4AAD347D-5ACD-4C99-B74B-A9C85AD731AF}" type="datetimeFigureOut">
               <a:rPr lang="en-US" smtClean="0"/>
-              <a:t>9/15/2022</a:t>
+              <a:t>9/19/2022</a:t>
             </a:fld>
             <a:endParaRPr lang="en-US" dirty="0"/>
           </a:p>
@@ -1049,7 +1049,7 @@
           <a:p>
             <a:fld id="{4AAD347D-5ACD-4C99-B74B-A9C85AD731AF}" type="datetimeFigureOut">
               <a:rPr lang="en-US" smtClean="0"/>
-              <a:t>9/15/2022</a:t>
+              <a:t>9/19/2022</a:t>
             </a:fld>
             <a:endParaRPr lang="en-US" dirty="0"/>
           </a:p>
@@ -1391,7 +1391,7 @@
           <a:p>
             <a:fld id="{4AAD347D-5ACD-4C99-B74B-A9C85AD731AF}" type="datetimeFigureOut">
               <a:rPr lang="en-US" smtClean="0"/>
-              <a:t>9/15/2022</a:t>
+              <a:t>9/19/2022</a:t>
             </a:fld>
             <a:endParaRPr lang="en-US" dirty="0"/>
           </a:p>
@@ -2015,7 +2015,7 @@
           <a:p>
             <a:fld id="{4AAD347D-5ACD-4C99-B74B-A9C85AD731AF}" type="datetimeFigureOut">
               <a:rPr lang="en-US" smtClean="0"/>
-              <a:t>9/15/2022</a:t>
+              <a:t>9/19/2022</a:t>
             </a:fld>
             <a:endParaRPr lang="en-US" dirty="0"/>
           </a:p>
@@ -2876,7 +2876,7 @@
           <a:p>
             <a:fld id="{4AAD347D-5ACD-4C99-B74B-A9C85AD731AF}" type="datetimeFigureOut">
               <a:rPr lang="en-US" smtClean="0"/>
-              <a:t>9/15/2022</a:t>
+              <a:t>9/19/2022</a:t>
             </a:fld>
             <a:endParaRPr lang="en-US" dirty="0"/>
           </a:p>
@@ -3047,7 +3047,7 @@
           <a:p>
             <a:fld id="{4509A250-FF31-4206-8172-F9D3106AACB1}" type="datetimeFigureOut">
               <a:rPr lang="en-US" smtClean="0"/>
-              <a:t>9/15/2022</a:t>
+              <a:t>9/19/2022</a:t>
             </a:fld>
             <a:endParaRPr lang="en-US" dirty="0"/>
           </a:p>
@@ -3227,7 +3227,7 @@
           <a:p>
             <a:fld id="{4509A250-FF31-4206-8172-F9D3106AACB1}" type="datetimeFigureOut">
               <a:rPr lang="en-US" smtClean="0"/>
-              <a:t>9/15/2022</a:t>
+              <a:t>9/19/2022</a:t>
             </a:fld>
             <a:endParaRPr lang="en-US" dirty="0"/>
           </a:p>
@@ -3397,7 +3397,7 @@
           <a:p>
             <a:fld id="{4509A250-FF31-4206-8172-F9D3106AACB1}" type="datetimeFigureOut">
               <a:rPr lang="en-US" smtClean="0"/>
-              <a:t>9/15/2022</a:t>
+              <a:t>9/19/2022</a:t>
             </a:fld>
             <a:endParaRPr lang="en-US" dirty="0"/>
           </a:p>
@@ -3644,7 +3644,7 @@
           <a:p>
             <a:fld id="{9796027F-7875-4030-9381-8BD8C4F21935}" type="datetimeFigureOut">
               <a:rPr lang="en-US" smtClean="0"/>
-              <a:t>9/15/2022</a:t>
+              <a:t>9/19/2022</a:t>
             </a:fld>
             <a:endParaRPr lang="en-US" dirty="0"/>
           </a:p>
@@ -3936,7 +3936,7 @@
           <a:p>
             <a:fld id="{9796027F-7875-4030-9381-8BD8C4F21935}" type="datetimeFigureOut">
               <a:rPr lang="en-US" smtClean="0"/>
-              <a:t>9/15/2022</a:t>
+              <a:t>9/19/2022</a:t>
             </a:fld>
             <a:endParaRPr lang="en-US" dirty="0"/>
           </a:p>
@@ -4380,7 +4380,7 @@
           <a:p>
             <a:fld id="{9796027F-7875-4030-9381-8BD8C4F21935}" type="datetimeFigureOut">
               <a:rPr lang="en-US" smtClean="0"/>
-              <a:t>9/15/2022</a:t>
+              <a:t>9/19/2022</a:t>
             </a:fld>
             <a:endParaRPr lang="en-US" dirty="0"/>
           </a:p>
@@ -4498,7 +4498,7 @@
           <a:p>
             <a:fld id="{4509A250-FF31-4206-8172-F9D3106AACB1}" type="datetimeFigureOut">
               <a:rPr lang="en-US" smtClean="0"/>
-              <a:t>9/15/2022</a:t>
+              <a:t>9/19/2022</a:t>
             </a:fld>
             <a:endParaRPr lang="en-US" dirty="0"/>
           </a:p>
@@ -4593,7 +4593,7 @@
           <a:p>
             <a:fld id="{4509A250-FF31-4206-8172-F9D3106AACB1}" type="datetimeFigureOut">
               <a:rPr lang="en-US" smtClean="0"/>
-              <a:t>9/15/2022</a:t>
+              <a:t>9/19/2022</a:t>
             </a:fld>
             <a:endParaRPr lang="en-US" dirty="0"/>
           </a:p>
@@ -4872,7 +4872,7 @@
           <a:p>
             <a:fld id="{4509A250-FF31-4206-8172-F9D3106AACB1}" type="datetimeFigureOut">
               <a:rPr lang="en-US" smtClean="0"/>
-              <a:t>9/15/2022</a:t>
+              <a:t>9/19/2022</a:t>
             </a:fld>
             <a:endParaRPr lang="en-US" dirty="0"/>
           </a:p>
@@ -5147,7 +5147,7 @@
           <a:p>
             <a:fld id="{4509A250-FF31-4206-8172-F9D3106AACB1}" type="datetimeFigureOut">
               <a:rPr lang="en-US" smtClean="0"/>
-              <a:t>9/15/2022</a:t>
+              <a:t>9/19/2022</a:t>
             </a:fld>
             <a:endParaRPr lang="en-US" dirty="0"/>
           </a:p>
@@ -5576,7 +5576,7 @@
           <a:p>
             <a:fld id="{4AAD347D-5ACD-4C99-B74B-A9C85AD731AF}" type="datetimeFigureOut">
               <a:rPr lang="en-US" smtClean="0"/>
-              <a:t>9/15/2022</a:t>
+              <a:t>9/19/2022</a:t>
             </a:fld>
             <a:endParaRPr lang="en-US" dirty="0"/>
           </a:p>
@@ -6419,24 +6419,90 @@
               <a:rPr lang="hu-HU" dirty="0" smtClean="0"/>
               <a:t>IPS</a:t>
             </a:r>
+            <a:r>
+              <a:rPr lang="hu-HU" dirty="0" smtClean="0">
+                <a:sym typeface="Wingdings" panose="05000000000000000000" pitchFamily="2" charset="2"/>
+              </a:rPr>
+              <a:t> </a:t>
+            </a:r>
+            <a:r>
+              <a:rPr lang="hu-HU" dirty="0" smtClean="0">
+                <a:sym typeface="Wingdings" panose="05000000000000000000" pitchFamily="2" charset="2"/>
+              </a:rPr>
+              <a:t>jó színmegjelenítés</a:t>
+            </a:r>
+            <a:endParaRPr lang="hu-HU" dirty="0" smtClean="0"/>
           </a:p>
           <a:p>
             <a:r>
               <a:rPr lang="hu-HU" dirty="0" smtClean="0"/>
               <a:t>VA</a:t>
             </a:r>
+            <a:r>
+              <a:rPr lang="hu-HU" dirty="0" smtClean="0">
+                <a:sym typeface="Wingdings" panose="05000000000000000000" pitchFamily="2" charset="2"/>
+              </a:rPr>
+              <a:t> legjobb betekintési szög</a:t>
+            </a:r>
+            <a:endParaRPr lang="hu-HU" dirty="0" smtClean="0"/>
           </a:p>
           <a:p>
             <a:r>
               <a:rPr lang="hu-HU" dirty="0" smtClean="0"/>
               <a:t>TN</a:t>
             </a:r>
+            <a:r>
+              <a:rPr lang="hu-HU" dirty="0" smtClean="0">
+                <a:sym typeface="Wingdings" panose="05000000000000000000" pitchFamily="2" charset="2"/>
+              </a:rPr>
+              <a:t> </a:t>
+            </a:r>
+            <a:r>
+              <a:rPr lang="hu-HU" dirty="0" smtClean="0"/>
+              <a:t>a </a:t>
+            </a:r>
+            <a:r>
+              <a:rPr lang="hu-HU" dirty="0"/>
+              <a:t>legalacsonyabb </a:t>
+            </a:r>
+            <a:r>
+              <a:rPr lang="hu-HU" dirty="0" smtClean="0"/>
+              <a:t>válaszidő</a:t>
+            </a:r>
+            <a:endParaRPr lang="hu-HU" dirty="0" smtClean="0"/>
           </a:p>
           <a:p>
             <a:r>
               <a:rPr lang="hu-HU" dirty="0" smtClean="0"/>
               <a:t>OLED</a:t>
             </a:r>
+            <a:r>
+              <a:rPr lang="hu-HU" dirty="0" smtClean="0">
+                <a:sym typeface="Wingdings" panose="05000000000000000000" pitchFamily="2" charset="2"/>
+              </a:rPr>
+              <a:t> legszebb kép</a:t>
+            </a:r>
+          </a:p>
+          <a:p>
+            <a:r>
+              <a:rPr lang="hu-HU" dirty="0" smtClean="0">
+                <a:sym typeface="Wingdings" panose="05000000000000000000" pitchFamily="2" charset="2"/>
+              </a:rPr>
+              <a:t>(az </a:t>
+            </a:r>
+            <a:r>
+              <a:rPr lang="hu-HU" dirty="0" err="1" smtClean="0">
+                <a:sym typeface="Wingdings" panose="05000000000000000000" pitchFamily="2" charset="2"/>
+              </a:rPr>
+              <a:t>ips-hez</a:t>
+            </a:r>
+            <a:r>
+              <a:rPr lang="hu-HU" dirty="0" smtClean="0">
+                <a:sym typeface="Wingdings" panose="05000000000000000000" pitchFamily="2" charset="2"/>
+              </a:rPr>
+              <a:t> közel áll)</a:t>
+            </a:r>
+            <a:endParaRPr lang="hu-HU" dirty="0" smtClean="0"/>
           </a:p>
           <a:p>
             <a:endParaRPr lang="hu-HU" dirty="0"/>
@@ -6693,6 +6759,49 @@
                                   </p:childTnLst>
                                 </p:cTn>
                               </p:par>
+                              <p:par>
+                                <p:cTn id="17" presetID="10" presetClass="entr" presetSubtype="0" fill="hold" grpId="0" nodeType="withEffect">
+                                  <p:stCondLst>
+                                    <p:cond delay="0"/>
+                                  </p:stCondLst>
+                                  <p:childTnLst>
+                                    <p:set>
+                                      <p:cBhvr>
+                                        <p:cTn id="18" dur="1" fill="hold">
+                                          <p:stCondLst>
+                                            <p:cond delay="0"/>
+                                          </p:stCondLst>
+                                        </p:cTn>
+                                        <p:tgtEl>
+                                          <p:spTgt spid="3">
+                                            <p:txEl>
+                                              <p:pRg st="4" end="4"/>
+                                            </p:txEl>
+                                          </p:spTgt>
+                                        </p:tgtEl>
+                                        <p:attrNameLst>
+                                          <p:attrName>style.visibility</p:attrName>
+                                        </p:attrNameLst>
+                                      </p:cBhvr>
+                                      <p:to>
+                                        <p:strVal val="visible"/>
+                                      </p:to>
+                                    </p:set>
+                                    <p:animEffect transition="in" filter="fade">
+                                      <p:cBhvr>
+                                        <p:cTn id="19" dur="500"/>
+                                        <p:tgtEl>
+                                          <p:spTgt spid="3">
+                                            <p:txEl>
+                                              <p:pRg st="4" end="4"/>
+                                            </p:txEl>
+                                          </p:spTgt>
+                                        </p:tgtEl>
+                                      </p:cBhvr>
+                                    </p:animEffect>
+                                  </p:childTnLst>
+                                </p:cTn>
+                              </p:par>
                             </p:childTnLst>
                           </p:cTn>
                         </p:par>
@@ -6700,26 +6809,26 @@
                     </p:cTn>
                   </p:par>
                   <p:par>
-                    <p:cTn id="17" fill="hold">
+                    <p:cTn id="20" fill="hold">
                       <p:stCondLst>
                         <p:cond delay="indefinite"/>
                       </p:stCondLst>
                       <p:childTnLst>
                         <p:par>
-                          <p:cTn id="18" fill="hold">
+                          <p:cTn id="21" fill="hold">
                             <p:stCondLst>
                               <p:cond delay="0"/>
                             </p:stCondLst>
                             <p:childTnLst>
                               <p:par>
-                                <p:cTn id="19" presetID="10" presetClass="entr" presetSubtype="0" fill="hold" nodeType="clickEffect">
+                                <p:cTn id="22" presetID="10" presetClass="entr" presetSubtype="0" fill="hold" nodeType="clickEffect">
                                   <p:stCondLst>
                                     <p:cond delay="0"/>
                                   </p:stCondLst>
                                   <p:childTnLst>
                                     <p:set>
                                       <p:cBhvr>
-                                        <p:cTn id="20" dur="1" fill="hold">
+                                        <p:cTn id="23" dur="1" fill="hold">
                                           <p:stCondLst>
                                             <p:cond delay="0"/>
                                           </p:stCondLst>
@@ -6737,7 +6846,7 @@
                                     </p:set>
                                     <p:animEffect transition="in" filter="fade">
                                       <p:cBhvr>
-                                        <p:cTn id="21" dur="500"/>
+                                        <p:cTn id="24" dur="500"/>
                                         <p:tgtEl>
                                           <p:spTgt spid="1026"/>
                                         </p:tgtEl>
@@ -7340,21 +7449,13 @@
           <a:p>
             <a:r>
               <a:rPr lang="hu-HU" dirty="0" smtClean="0"/>
-              <a:t>1080p	(1920x1080px</a:t>
-            </a:r>
+              <a:t>1080p	(1920x1080px)</a:t>
+            </a:r>
+          </a:p>
+          <a:p>
             <a:r>
               <a:rPr lang="hu-HU" dirty="0" smtClean="0"/>
-              <a:t>)</a:t>
-            </a:r>
-          </a:p>
-          <a:p>
-            <a:r>
-              <a:rPr lang="hu-HU" dirty="0" smtClean="0"/>
-              <a:t>1440p	(</a:t>
-            </a:r>
-            <a:r>
-              <a:rPr lang="hu-HU" dirty="0" smtClean="0"/>
-              <a:t>2560x1440px)</a:t>
+              <a:t>1440p	(2560x1440px)</a:t>
             </a:r>
           </a:p>
           <a:p>
@@ -7362,7 +7463,6 @@
               <a:rPr lang="hu-HU" dirty="0" smtClean="0"/>
               <a:t>4k		(3840x2160px)</a:t>
             </a:r>
-            <a:endParaRPr lang="hu-HU" dirty="0" smtClean="0"/>
           </a:p>
           <a:p>
             <a:r>
@@ -7621,6 +7721,59 @@
                                               <p:pRg st="3" end="3"/>
                                             </p:txEl>
                                           </p:spTgt>
+                                        </p:tgtEl>
+                                      </p:cBhvr>
+                                    </p:animEffect>
+                                  </p:childTnLst>
+                                </p:cTn>
+                              </p:par>
+                            </p:childTnLst>
+                          </p:cTn>
+                        </p:par>
+                      </p:childTnLst>
+                    </p:cTn>
+                  </p:par>
+                  <p:par>
+                    <p:cTn id="17" fill="hold">
+                      <p:stCondLst>
+                        <p:cond delay="indefinite"/>
+                      </p:stCondLst>
+                      <p:childTnLst>
+                        <p:par>
+                          <p:cTn id="18" fill="hold">
+                            <p:stCondLst>
+                              <p:cond delay="0"/>
+                            </p:stCondLst>
+                            <p:childTnLst>
+                              <p:par>
+                                <p:cTn id="19" presetID="10" presetClass="entr" presetSubtype="0" fill="hold" nodeType="clickEffect">
+                                  <p:stCondLst>
+                                    <p:cond delay="0"/>
+                                  </p:stCondLst>
+                                  <p:childTnLst>
+                                    <p:set>
+                                      <p:cBhvr>
+                                        <p:cTn id="20" dur="1" fill="hold">
+                                          <p:stCondLst>
+                                            <p:cond delay="0"/>
+                                          </p:stCondLst>
+                                        </p:cTn>
+                                        <p:tgtEl>
+                                          <p:spTgt spid="1028"/>
+                                        </p:tgtEl>
+                                        <p:attrNameLst>
+                                          <p:attrName>style.visibility</p:attrName>
+                                        </p:attrNameLst>
+                                      </p:cBhvr>
+                                      <p:to>
+                                        <p:strVal val="visible"/>
+                                      </p:to>
+                                    </p:set>
+                                    <p:animEffect transition="in" filter="fade">
+                                      <p:cBhvr>
+                                        <p:cTn id="21" dur="500"/>
+                                        <p:tgtEl>
+                                          <p:spTgt spid="1028"/>
                                         </p:tgtEl>
                                       </p:cBhvr>
                                     </p:animEffect>
@@ -8140,11 +8293,7 @@
           <a:p>
             <a:r>
               <a:rPr lang="hu-HU" dirty="0" smtClean="0"/>
-              <a:t>Ívelt </a:t>
-            </a:r>
-            <a:r>
-              <a:rPr lang="hu-HU" dirty="0" smtClean="0"/>
-              <a:t>kijelző</a:t>
+              <a:t>Ívelt kijelző</a:t>
             </a:r>
           </a:p>
           <a:p>
@@ -8158,6 +8307,24 @@
               <a:rPr lang="hu-HU" dirty="0" smtClean="0"/>
               <a:t>Hangszóró</a:t>
             </a:r>
+          </a:p>
+          <a:p>
+            <a:r>
+              <a:rPr lang="hu-HU" dirty="0" smtClean="0"/>
+              <a:t>Különböző </a:t>
+            </a:r>
+            <a:r>
+              <a:rPr lang="hu-HU" dirty="0" err="1" smtClean="0"/>
+              <a:t>profilok,beállítások</a:t>
+            </a:r>
+            <a:endParaRPr lang="hu-HU" dirty="0" smtClean="0"/>
+          </a:p>
+          <a:p>
+            <a:r>
+              <a:rPr lang="hu-HU" dirty="0" smtClean="0"/>
+              <a:t>Állíthatóság</a:t>
+            </a:r>
+            <a:endParaRPr lang="hu-HU" dirty="0" smtClean="0"/>
           </a:p>
           <a:p>
             <a:endParaRPr lang="hu-HU" dirty="0" smtClean="0"/>
@@ -8268,15 +8435,7 @@
               <a:srgbClr val="FFFFFF"/>
             </a:contourClr>
           </a:sp3d>
-          <a:extLst>
-            <a:ext uri="{909E8E84-426E-40DD-AFC4-6F175D3DCCD1}">
-              <a14:hiddenFill xmlns:a14="http://schemas.microsoft.com/office/drawing/2010/main">
-                <a:solidFill>
-                  <a:srgbClr val="FFFFFF"/>
-                </a:solidFill>
-              </a14:hiddenFill>
-            </a:ext>
-          </a:extLst>
+          <a:extLst/>
         </p:spPr>
       </p:pic>
     </p:spTree>
@@ -8524,6 +8683,92 @@
                                   </p:childTnLst>
                                 </p:cTn>
                               </p:par>
+                              <p:par>
+                                <p:cTn id="20" presetID="10" presetClass="entr" presetSubtype="0" fill="hold" grpId="0" nodeType="withEffect">
+                                  <p:stCondLst>
+                                    <p:cond delay="0"/>
+                                  </p:stCondLst>
+                                  <p:childTnLst>
+                                    <p:set>
+                                      <p:cBhvr>
+                                        <p:cTn id="21" dur="1" fill="hold">
+                                          <p:stCondLst>
+                                            <p:cond delay="0"/>
+                                          </p:stCondLst>
+                                        </p:cTn>
+                                        <p:tgtEl>
+                                          <p:spTgt spid="3">
+                                            <p:txEl>
+                                              <p:pRg st="5" end="5"/>
+                                            </p:txEl>
+                                          </p:spTgt>
+                                        </p:tgtEl>
+                                        <p:attrNameLst>
+                                          <p:attrName>style.visibility</p:attrName>
+                                        </p:attrNameLst>
+                                      </p:cBhvr>
+                                      <p:to>
+                                        <p:strVal val="visible"/>
+                                      </p:to>
+                                    </p:set>
+                                    <p:animEffect transition="in" filter="fade">
+                                      <p:cBhvr>
+                                        <p:cTn id="22" dur="500"/>
+                                        <p:tgtEl>
+                                          <p:spTgt spid="3">
+                                            <p:txEl>
+                                              <p:pRg st="5" end="5"/>
+                                            </p:txEl>
+                                          </p:spTgt>
+                                        </p:tgtEl>
+                                      </p:cBhvr>
+                                    </p:animEffect>
+                                  </p:childTnLst>
+                                </p:cTn>
+                              </p:par>
+                              <p:par>
+                                <p:cTn id="23" presetID="10" presetClass="entr" presetSubtype="0" fill="hold" grpId="0" nodeType="withEffect">
+                                  <p:stCondLst>
+                                    <p:cond delay="0"/>
+                                  </p:stCondLst>
+                                  <p:childTnLst>
+                                    <p:set>
+                                      <p:cBhvr>
+                                        <p:cTn id="24" dur="1" fill="hold">
+                                          <p:stCondLst>
+                                            <p:cond delay="0"/>
+                                          </p:stCondLst>
+                                        </p:cTn>
+                                        <p:tgtEl>
+                                          <p:spTgt spid="3">
+                                            <p:txEl>
+                                              <p:pRg st="6" end="6"/>
+                                            </p:txEl>
+                                          </p:spTgt>
+                                        </p:tgtEl>
+                                        <p:attrNameLst>
+                                          <p:attrName>style.visibility</p:attrName>
+                                        </p:attrNameLst>
+                                      </p:cBhvr>
+                                      <p:to>
+                                        <p:strVal val="visible"/>
+                                      </p:to>
+                                    </p:set>
+                                    <p:animEffect transition="in" filter="fade">
+                                      <p:cBhvr>
+                                        <p:cTn id="25" dur="500"/>
+                                        <p:tgtEl>
+                                          <p:spTgt spid="3">
+                                            <p:txEl>
+                                              <p:pRg st="6" end="6"/>
+                                            </p:txEl>
+                                          </p:spTgt>
+                                        </p:tgtEl>
+                                      </p:cBhvr>
+                                    </p:animEffect>
+                                  </p:childTnLst>
+                                </p:cTn>
+                              </p:par>
                             </p:childTnLst>
                           </p:cTn>
                         </p:par>
@@ -8531,26 +8776,26 @@
                     </p:cTn>
                   </p:par>
                   <p:par>
-                    <p:cTn id="20" fill="hold">
+                    <p:cTn id="26" fill="hold">
                       <p:stCondLst>
                         <p:cond delay="indefinite"/>
                       </p:stCondLst>
                       <p:childTnLst>
                         <p:par>
-                          <p:cTn id="21" fill="hold">
+                          <p:cTn id="27" fill="hold">
                             <p:stCondLst>
                               <p:cond delay="0"/>
                             </p:stCondLst>
                             <p:childTnLst>
                               <p:par>
-                                <p:cTn id="22" presetID="10" presetClass="entr" presetSubtype="0" fill="hold" nodeType="clickEffect">
+                                <p:cTn id="28" presetID="10" presetClass="entr" presetSubtype="0" fill="hold" nodeType="clickEffect">
                                   <p:stCondLst>
                                     <p:cond delay="0"/>
                                   </p:stCondLst>
                                   <p:childTnLst>
                                     <p:set>
                                       <p:cBhvr>
-                                        <p:cTn id="23" dur="1" fill="hold">
+                                        <p:cTn id="29" dur="1" fill="hold">
                                           <p:stCondLst>
                                             <p:cond delay="0"/>
                                           </p:stCondLst>
@@ -8568,7 +8813,7 @@
                                     </p:set>
                                     <p:animEffect transition="in" filter="fade">
                                       <p:cBhvr>
-                                        <p:cTn id="24" dur="500"/>
+                                        <p:cTn id="30" dur="500"/>
                                         <p:tgtEl>
                                           <p:spTgt spid="2050"/>
                                         </p:tgtEl>
@@ -8578,14 +8823,14 @@
                                 </p:cTn>
                               </p:par>
                               <p:par>
-                                <p:cTn id="25" presetID="10" presetClass="entr" presetSubtype="0" fill="hold" nodeType="withEffect">
+                                <p:cTn id="31" presetID="10" presetClass="entr" presetSubtype="0" fill="hold" nodeType="withEffect">
                                   <p:stCondLst>
                                     <p:cond delay="0"/>
                                   </p:stCondLst>
                                   <p:childTnLst>
                                     <p:set>
                                       <p:cBhvr>
-                                        <p:cTn id="26" dur="1" fill="hold">
+                                        <p:cTn id="32" dur="1" fill="hold">
                                           <p:stCondLst>
                                             <p:cond delay="0"/>
                                           </p:stCondLst>
@@ -8603,7 +8848,7 @@
                                     </p:set>
                                     <p:animEffect transition="in" filter="fade">
                                       <p:cBhvr>
-                                        <p:cTn id="27" dur="500"/>
+                                        <p:cTn id="33" dur="500"/>
                                         <p:tgtEl>
                                           <p:spTgt spid="2052"/>
                                         </p:tgtEl>

</xml_diff>